<commit_message>
Updated presentation and literature review. Cleaned up GUI in simulation.
</commit_message>
<xml_diff>
--- a/Documents/Intermediate Presentation/Intermediate Presentation.pptx
+++ b/Documents/Intermediate Presentation/Intermediate Presentation.pptx
@@ -7,9 +7,10 @@
   <p:sldIdLst>
     <p:sldId id="256" r:id="rId2"/>
     <p:sldId id="257" r:id="rId3"/>
-    <p:sldId id="259" r:id="rId4"/>
-    <p:sldId id="258" r:id="rId5"/>
-    <p:sldId id="260" r:id="rId6"/>
+    <p:sldId id="261" r:id="rId4"/>
+    <p:sldId id="259" r:id="rId5"/>
+    <p:sldId id="258" r:id="rId6"/>
+    <p:sldId id="260" r:id="rId7"/>
   </p:sldIdLst>
   <p:sldSz cx="12192000" cy="6858000"/>
   <p:notesSz cx="6858000" cy="9144000"/>
@@ -1614,7 +1615,1120 @@
 </dgm:colorsDef>
 </file>
 
+<file path=ppt/diagrams/colors3.xml><?xml version="1.0" encoding="utf-8"?>
+<dgm:colorsDef xmlns:dgm="http://schemas.openxmlformats.org/drawingml/2006/diagram" xmlns:a="http://schemas.openxmlformats.org/drawingml/2006/main" uniqueId="urn:microsoft.com/office/officeart/2005/8/colors/accent1_2">
+  <dgm:title val=""/>
+  <dgm:desc val=""/>
+  <dgm:catLst>
+    <dgm:cat type="accent1" pri="11200"/>
+  </dgm:catLst>
+  <dgm:styleLbl name="node0">
+    <dgm:fillClrLst meth="repeat">
+      <a:schemeClr val="accent1"/>
+    </dgm:fillClrLst>
+    <dgm:linClrLst meth="repeat">
+      <a:schemeClr val="lt1"/>
+    </dgm:linClrLst>
+    <dgm:effectClrLst/>
+    <dgm:txLinClrLst/>
+    <dgm:txFillClrLst/>
+    <dgm:txEffectClrLst/>
+  </dgm:styleLbl>
+  <dgm:styleLbl name="alignNode1">
+    <dgm:fillClrLst meth="repeat">
+      <a:schemeClr val="accent1"/>
+    </dgm:fillClrLst>
+    <dgm:linClrLst meth="repeat">
+      <a:schemeClr val="accent1"/>
+    </dgm:linClrLst>
+    <dgm:effectClrLst/>
+    <dgm:txLinClrLst/>
+    <dgm:txFillClrLst/>
+    <dgm:txEffectClrLst/>
+  </dgm:styleLbl>
+  <dgm:styleLbl name="node1">
+    <dgm:fillClrLst meth="repeat">
+      <a:schemeClr val="accent1"/>
+    </dgm:fillClrLst>
+    <dgm:linClrLst meth="repeat">
+      <a:schemeClr val="lt1"/>
+    </dgm:linClrLst>
+    <dgm:effectClrLst/>
+    <dgm:txLinClrLst/>
+    <dgm:txFillClrLst/>
+    <dgm:txEffectClrLst/>
+  </dgm:styleLbl>
+  <dgm:styleLbl name="lnNode1">
+    <dgm:fillClrLst meth="repeat">
+      <a:schemeClr val="accent1"/>
+    </dgm:fillClrLst>
+    <dgm:linClrLst meth="repeat">
+      <a:schemeClr val="lt1"/>
+    </dgm:linClrLst>
+    <dgm:effectClrLst/>
+    <dgm:txLinClrLst/>
+    <dgm:txFillClrLst/>
+    <dgm:txEffectClrLst/>
+  </dgm:styleLbl>
+  <dgm:styleLbl name="vennNode1">
+    <dgm:fillClrLst meth="repeat">
+      <a:schemeClr val="accent1">
+        <a:alpha val="50000"/>
+      </a:schemeClr>
+    </dgm:fillClrLst>
+    <dgm:linClrLst meth="repeat">
+      <a:schemeClr val="lt1"/>
+    </dgm:linClrLst>
+    <dgm:effectClrLst/>
+    <dgm:txLinClrLst/>
+    <dgm:txFillClrLst/>
+    <dgm:txEffectClrLst/>
+  </dgm:styleLbl>
+  <dgm:styleLbl name="node2">
+    <dgm:fillClrLst meth="repeat">
+      <a:schemeClr val="accent1"/>
+    </dgm:fillClrLst>
+    <dgm:linClrLst meth="repeat">
+      <a:schemeClr val="lt1"/>
+    </dgm:linClrLst>
+    <dgm:effectClrLst/>
+    <dgm:txLinClrLst/>
+    <dgm:txFillClrLst/>
+    <dgm:txEffectClrLst/>
+  </dgm:styleLbl>
+  <dgm:styleLbl name="node3">
+    <dgm:fillClrLst meth="repeat">
+      <a:schemeClr val="accent1"/>
+    </dgm:fillClrLst>
+    <dgm:linClrLst meth="repeat">
+      <a:schemeClr val="lt1"/>
+    </dgm:linClrLst>
+    <dgm:effectClrLst/>
+    <dgm:txLinClrLst/>
+    <dgm:txFillClrLst/>
+    <dgm:txEffectClrLst/>
+  </dgm:styleLbl>
+  <dgm:styleLbl name="node4">
+    <dgm:fillClrLst meth="repeat">
+      <a:schemeClr val="accent1"/>
+    </dgm:fillClrLst>
+    <dgm:linClrLst meth="repeat">
+      <a:schemeClr val="lt1"/>
+    </dgm:linClrLst>
+    <dgm:effectClrLst/>
+    <dgm:txLinClrLst/>
+    <dgm:txFillClrLst/>
+    <dgm:txEffectClrLst/>
+  </dgm:styleLbl>
+  <dgm:styleLbl name="fgImgPlace1">
+    <dgm:fillClrLst meth="repeat">
+      <a:schemeClr val="accent1">
+        <a:tint val="50000"/>
+      </a:schemeClr>
+    </dgm:fillClrLst>
+    <dgm:linClrLst meth="repeat">
+      <a:schemeClr val="lt1"/>
+    </dgm:linClrLst>
+    <dgm:effectClrLst/>
+    <dgm:txLinClrLst/>
+    <dgm:txFillClrLst meth="repeat">
+      <a:schemeClr val="lt1"/>
+    </dgm:txFillClrLst>
+    <dgm:txEffectClrLst/>
+  </dgm:styleLbl>
+  <dgm:styleLbl name="alignImgPlace1">
+    <dgm:fillClrLst meth="repeat">
+      <a:schemeClr val="accent1">
+        <a:tint val="50000"/>
+      </a:schemeClr>
+    </dgm:fillClrLst>
+    <dgm:linClrLst meth="repeat">
+      <a:schemeClr val="lt1"/>
+    </dgm:linClrLst>
+    <dgm:effectClrLst/>
+    <dgm:txLinClrLst/>
+    <dgm:txFillClrLst meth="repeat">
+      <a:schemeClr val="lt1"/>
+    </dgm:txFillClrLst>
+    <dgm:txEffectClrLst/>
+  </dgm:styleLbl>
+  <dgm:styleLbl name="bgImgPlace1">
+    <dgm:fillClrLst meth="repeat">
+      <a:schemeClr val="accent1">
+        <a:tint val="50000"/>
+      </a:schemeClr>
+    </dgm:fillClrLst>
+    <dgm:linClrLst meth="repeat">
+      <a:schemeClr val="lt1"/>
+    </dgm:linClrLst>
+    <dgm:effectClrLst/>
+    <dgm:txLinClrLst/>
+    <dgm:txFillClrLst meth="repeat">
+      <a:schemeClr val="lt1"/>
+    </dgm:txFillClrLst>
+    <dgm:txEffectClrLst/>
+  </dgm:styleLbl>
+  <dgm:styleLbl name="sibTrans2D1">
+    <dgm:fillClrLst meth="repeat">
+      <a:schemeClr val="accent1">
+        <a:tint val="60000"/>
+      </a:schemeClr>
+    </dgm:fillClrLst>
+    <dgm:linClrLst meth="repeat">
+      <a:schemeClr val="accent1">
+        <a:tint val="60000"/>
+      </a:schemeClr>
+    </dgm:linClrLst>
+    <dgm:effectClrLst/>
+    <dgm:txLinClrLst/>
+    <dgm:txFillClrLst/>
+    <dgm:txEffectClrLst/>
+  </dgm:styleLbl>
+  <dgm:styleLbl name="fgSibTrans2D1">
+    <dgm:fillClrLst meth="repeat">
+      <a:schemeClr val="accent1">
+        <a:tint val="60000"/>
+      </a:schemeClr>
+    </dgm:fillClrLst>
+    <dgm:linClrLst meth="repeat">
+      <a:schemeClr val="accent1">
+        <a:tint val="60000"/>
+      </a:schemeClr>
+    </dgm:linClrLst>
+    <dgm:effectClrLst/>
+    <dgm:txLinClrLst/>
+    <dgm:txFillClrLst/>
+    <dgm:txEffectClrLst/>
+  </dgm:styleLbl>
+  <dgm:styleLbl name="bgSibTrans2D1">
+    <dgm:fillClrLst meth="repeat">
+      <a:schemeClr val="accent1">
+        <a:tint val="60000"/>
+      </a:schemeClr>
+    </dgm:fillClrLst>
+    <dgm:linClrLst meth="repeat">
+      <a:schemeClr val="accent1">
+        <a:tint val="60000"/>
+      </a:schemeClr>
+    </dgm:linClrLst>
+    <dgm:effectClrLst/>
+    <dgm:txLinClrLst/>
+    <dgm:txFillClrLst/>
+    <dgm:txEffectClrLst/>
+  </dgm:styleLbl>
+  <dgm:styleLbl name="sibTrans1D1">
+    <dgm:fillClrLst meth="repeat">
+      <a:schemeClr val="accent1"/>
+    </dgm:fillClrLst>
+    <dgm:linClrLst meth="repeat">
+      <a:schemeClr val="accent1"/>
+    </dgm:linClrLst>
+    <dgm:effectClrLst/>
+    <dgm:txLinClrLst/>
+    <dgm:txFillClrLst meth="repeat">
+      <a:schemeClr val="tx1"/>
+    </dgm:txFillClrLst>
+    <dgm:txEffectClrLst/>
+  </dgm:styleLbl>
+  <dgm:styleLbl name="callout">
+    <dgm:fillClrLst meth="repeat">
+      <a:schemeClr val="accent1"/>
+    </dgm:fillClrLst>
+    <dgm:linClrLst meth="repeat">
+      <a:schemeClr val="accent1">
+        <a:tint val="50000"/>
+      </a:schemeClr>
+    </dgm:linClrLst>
+    <dgm:effectClrLst/>
+    <dgm:txLinClrLst/>
+    <dgm:txFillClrLst meth="repeat">
+      <a:schemeClr val="tx1"/>
+    </dgm:txFillClrLst>
+    <dgm:txEffectClrLst/>
+  </dgm:styleLbl>
+  <dgm:styleLbl name="asst0">
+    <dgm:fillClrLst meth="repeat">
+      <a:schemeClr val="accent1"/>
+    </dgm:fillClrLst>
+    <dgm:linClrLst meth="repeat">
+      <a:schemeClr val="lt1"/>
+    </dgm:linClrLst>
+    <dgm:effectClrLst/>
+    <dgm:txLinClrLst/>
+    <dgm:txFillClrLst/>
+    <dgm:txEffectClrLst/>
+  </dgm:styleLbl>
+  <dgm:styleLbl name="asst1">
+    <dgm:fillClrLst meth="repeat">
+      <a:schemeClr val="accent1"/>
+    </dgm:fillClrLst>
+    <dgm:linClrLst meth="repeat">
+      <a:schemeClr val="lt1"/>
+    </dgm:linClrLst>
+    <dgm:effectClrLst/>
+    <dgm:txLinClrLst/>
+    <dgm:txFillClrLst/>
+    <dgm:txEffectClrLst/>
+  </dgm:styleLbl>
+  <dgm:styleLbl name="asst2">
+    <dgm:fillClrLst meth="repeat">
+      <a:schemeClr val="accent1"/>
+    </dgm:fillClrLst>
+    <dgm:linClrLst meth="repeat">
+      <a:schemeClr val="lt1"/>
+    </dgm:linClrLst>
+    <dgm:effectClrLst/>
+    <dgm:txLinClrLst/>
+    <dgm:txFillClrLst/>
+    <dgm:txEffectClrLst/>
+  </dgm:styleLbl>
+  <dgm:styleLbl name="asst3">
+    <dgm:fillClrLst meth="repeat">
+      <a:schemeClr val="accent1"/>
+    </dgm:fillClrLst>
+    <dgm:linClrLst meth="repeat">
+      <a:schemeClr val="lt1"/>
+    </dgm:linClrLst>
+    <dgm:effectClrLst/>
+    <dgm:txLinClrLst/>
+    <dgm:txFillClrLst/>
+    <dgm:txEffectClrLst/>
+  </dgm:styleLbl>
+  <dgm:styleLbl name="asst4">
+    <dgm:fillClrLst meth="repeat">
+      <a:schemeClr val="accent1"/>
+    </dgm:fillClrLst>
+    <dgm:linClrLst meth="repeat">
+      <a:schemeClr val="lt1"/>
+    </dgm:linClrLst>
+    <dgm:effectClrLst/>
+    <dgm:txLinClrLst/>
+    <dgm:txFillClrLst/>
+    <dgm:txEffectClrLst/>
+  </dgm:styleLbl>
+  <dgm:styleLbl name="parChTrans2D1">
+    <dgm:fillClrLst meth="repeat">
+      <a:schemeClr val="accent1">
+        <a:tint val="60000"/>
+      </a:schemeClr>
+    </dgm:fillClrLst>
+    <dgm:linClrLst meth="repeat">
+      <a:schemeClr val="accent1">
+        <a:tint val="60000"/>
+      </a:schemeClr>
+    </dgm:linClrLst>
+    <dgm:effectClrLst/>
+    <dgm:txLinClrLst/>
+    <dgm:txFillClrLst meth="repeat">
+      <a:schemeClr val="lt1"/>
+    </dgm:txFillClrLst>
+    <dgm:txEffectClrLst/>
+  </dgm:styleLbl>
+  <dgm:styleLbl name="parChTrans2D2">
+    <dgm:fillClrLst meth="repeat">
+      <a:schemeClr val="accent1"/>
+    </dgm:fillClrLst>
+    <dgm:linClrLst meth="repeat">
+      <a:schemeClr val="accent1"/>
+    </dgm:linClrLst>
+    <dgm:effectClrLst/>
+    <dgm:txLinClrLst/>
+    <dgm:txFillClrLst meth="repeat">
+      <a:schemeClr val="lt1"/>
+    </dgm:txFillClrLst>
+    <dgm:txEffectClrLst/>
+  </dgm:styleLbl>
+  <dgm:styleLbl name="parChTrans2D3">
+    <dgm:fillClrLst meth="repeat">
+      <a:schemeClr val="accent1"/>
+    </dgm:fillClrLst>
+    <dgm:linClrLst meth="repeat">
+      <a:schemeClr val="accent1"/>
+    </dgm:linClrLst>
+    <dgm:effectClrLst/>
+    <dgm:txLinClrLst/>
+    <dgm:txFillClrLst meth="repeat">
+      <a:schemeClr val="lt1"/>
+    </dgm:txFillClrLst>
+    <dgm:txEffectClrLst/>
+  </dgm:styleLbl>
+  <dgm:styleLbl name="parChTrans2D4">
+    <dgm:fillClrLst meth="repeat">
+      <a:schemeClr val="accent1"/>
+    </dgm:fillClrLst>
+    <dgm:linClrLst meth="repeat">
+      <a:schemeClr val="accent1"/>
+    </dgm:linClrLst>
+    <dgm:effectClrLst/>
+    <dgm:txLinClrLst/>
+    <dgm:txFillClrLst meth="repeat">
+      <a:schemeClr val="lt1"/>
+    </dgm:txFillClrLst>
+    <dgm:txEffectClrLst/>
+  </dgm:styleLbl>
+  <dgm:styleLbl name="parChTrans1D1">
+    <dgm:fillClrLst meth="repeat">
+      <a:schemeClr val="accent1"/>
+    </dgm:fillClrLst>
+    <dgm:linClrLst meth="repeat">
+      <a:schemeClr val="accent1">
+        <a:shade val="60000"/>
+      </a:schemeClr>
+    </dgm:linClrLst>
+    <dgm:effectClrLst/>
+    <dgm:txLinClrLst/>
+    <dgm:txFillClrLst meth="repeat">
+      <a:schemeClr val="tx1"/>
+    </dgm:txFillClrLst>
+    <dgm:txEffectClrLst/>
+  </dgm:styleLbl>
+  <dgm:styleLbl name="parChTrans1D2">
+    <dgm:fillClrLst meth="repeat">
+      <a:schemeClr val="accent1"/>
+    </dgm:fillClrLst>
+    <dgm:linClrLst meth="repeat">
+      <a:schemeClr val="accent1">
+        <a:shade val="60000"/>
+      </a:schemeClr>
+    </dgm:linClrLst>
+    <dgm:effectClrLst/>
+    <dgm:txLinClrLst/>
+    <dgm:txFillClrLst meth="repeat">
+      <a:schemeClr val="tx1"/>
+    </dgm:txFillClrLst>
+    <dgm:txEffectClrLst/>
+  </dgm:styleLbl>
+  <dgm:styleLbl name="parChTrans1D3">
+    <dgm:fillClrLst meth="repeat">
+      <a:schemeClr val="accent1"/>
+    </dgm:fillClrLst>
+    <dgm:linClrLst meth="repeat">
+      <a:schemeClr val="accent1">
+        <a:shade val="80000"/>
+      </a:schemeClr>
+    </dgm:linClrLst>
+    <dgm:effectClrLst/>
+    <dgm:txLinClrLst/>
+    <dgm:txFillClrLst meth="repeat">
+      <a:schemeClr val="tx1"/>
+    </dgm:txFillClrLst>
+    <dgm:txEffectClrLst/>
+  </dgm:styleLbl>
+  <dgm:styleLbl name="parChTrans1D4">
+    <dgm:fillClrLst meth="repeat">
+      <a:schemeClr val="accent1"/>
+    </dgm:fillClrLst>
+    <dgm:linClrLst meth="repeat">
+      <a:schemeClr val="accent1">
+        <a:shade val="80000"/>
+      </a:schemeClr>
+    </dgm:linClrLst>
+    <dgm:effectClrLst/>
+    <dgm:txLinClrLst/>
+    <dgm:txFillClrLst meth="repeat">
+      <a:schemeClr val="tx1"/>
+    </dgm:txFillClrLst>
+    <dgm:txEffectClrLst/>
+  </dgm:styleLbl>
+  <dgm:styleLbl name="fgAcc1">
+    <dgm:fillClrLst meth="repeat">
+      <a:schemeClr val="lt1">
+        <a:alpha val="90000"/>
+      </a:schemeClr>
+    </dgm:fillClrLst>
+    <dgm:linClrLst meth="repeat">
+      <a:schemeClr val="accent1"/>
+    </dgm:linClrLst>
+    <dgm:effectClrLst/>
+    <dgm:txLinClrLst/>
+    <dgm:txFillClrLst meth="repeat">
+      <a:schemeClr val="dk1"/>
+    </dgm:txFillClrLst>
+    <dgm:txEffectClrLst/>
+  </dgm:styleLbl>
+  <dgm:styleLbl name="conFgAcc1">
+    <dgm:fillClrLst meth="repeat">
+      <a:schemeClr val="lt1">
+        <a:alpha val="90000"/>
+      </a:schemeClr>
+    </dgm:fillClrLst>
+    <dgm:linClrLst meth="repeat">
+      <a:schemeClr val="accent1"/>
+    </dgm:linClrLst>
+    <dgm:effectClrLst/>
+    <dgm:txLinClrLst/>
+    <dgm:txFillClrLst meth="repeat">
+      <a:schemeClr val="dk1"/>
+    </dgm:txFillClrLst>
+    <dgm:txEffectClrLst/>
+  </dgm:styleLbl>
+  <dgm:styleLbl name="alignAcc1">
+    <dgm:fillClrLst meth="repeat">
+      <a:schemeClr val="lt1">
+        <a:alpha val="90000"/>
+      </a:schemeClr>
+    </dgm:fillClrLst>
+    <dgm:linClrLst meth="repeat">
+      <a:schemeClr val="accent1"/>
+    </dgm:linClrLst>
+    <dgm:effectClrLst/>
+    <dgm:txLinClrLst/>
+    <dgm:txFillClrLst meth="repeat">
+      <a:schemeClr val="dk1"/>
+    </dgm:txFillClrLst>
+    <dgm:txEffectClrLst/>
+  </dgm:styleLbl>
+  <dgm:styleLbl name="trAlignAcc1">
+    <dgm:fillClrLst meth="repeat">
+      <a:schemeClr val="lt1">
+        <a:alpha val="40000"/>
+      </a:schemeClr>
+    </dgm:fillClrLst>
+    <dgm:linClrLst meth="repeat">
+      <a:schemeClr val="accent1"/>
+    </dgm:linClrLst>
+    <dgm:effectClrLst/>
+    <dgm:txLinClrLst/>
+    <dgm:txFillClrLst meth="repeat">
+      <a:schemeClr val="dk1"/>
+    </dgm:txFillClrLst>
+    <dgm:txEffectClrLst/>
+  </dgm:styleLbl>
+  <dgm:styleLbl name="bgAcc1">
+    <dgm:fillClrLst meth="repeat">
+      <a:schemeClr val="lt1">
+        <a:alpha val="90000"/>
+      </a:schemeClr>
+    </dgm:fillClrLst>
+    <dgm:linClrLst meth="repeat">
+      <a:schemeClr val="accent1"/>
+    </dgm:linClrLst>
+    <dgm:effectClrLst/>
+    <dgm:txLinClrLst/>
+    <dgm:txFillClrLst meth="repeat">
+      <a:schemeClr val="dk1"/>
+    </dgm:txFillClrLst>
+    <dgm:txEffectClrLst/>
+  </dgm:styleLbl>
+  <dgm:styleLbl name="solidFgAcc1">
+    <dgm:fillClrLst meth="repeat">
+      <a:schemeClr val="lt1"/>
+    </dgm:fillClrLst>
+    <dgm:linClrLst meth="repeat">
+      <a:schemeClr val="accent1"/>
+    </dgm:linClrLst>
+    <dgm:effectClrLst/>
+    <dgm:txLinClrLst/>
+    <dgm:txFillClrLst meth="repeat">
+      <a:schemeClr val="dk1"/>
+    </dgm:txFillClrLst>
+    <dgm:txEffectClrLst/>
+  </dgm:styleLbl>
+  <dgm:styleLbl name="solidAlignAcc1">
+    <dgm:fillClrLst meth="repeat">
+      <a:schemeClr val="lt1"/>
+    </dgm:fillClrLst>
+    <dgm:linClrLst meth="repeat">
+      <a:schemeClr val="accent1"/>
+    </dgm:linClrLst>
+    <dgm:effectClrLst/>
+    <dgm:txLinClrLst/>
+    <dgm:txFillClrLst meth="repeat">
+      <a:schemeClr val="dk1"/>
+    </dgm:txFillClrLst>
+    <dgm:txEffectClrLst/>
+  </dgm:styleLbl>
+  <dgm:styleLbl name="solidBgAcc1">
+    <dgm:fillClrLst meth="repeat">
+      <a:schemeClr val="lt1"/>
+    </dgm:fillClrLst>
+    <dgm:linClrLst meth="repeat">
+      <a:schemeClr val="accent1"/>
+    </dgm:linClrLst>
+    <dgm:effectClrLst/>
+    <dgm:txLinClrLst/>
+    <dgm:txFillClrLst meth="repeat">
+      <a:schemeClr val="dk1"/>
+    </dgm:txFillClrLst>
+    <dgm:txEffectClrLst/>
+  </dgm:styleLbl>
+  <dgm:styleLbl name="fgAccFollowNode1">
+    <dgm:fillClrLst meth="repeat">
+      <a:schemeClr val="accent1">
+        <a:alpha val="90000"/>
+        <a:tint val="40000"/>
+      </a:schemeClr>
+    </dgm:fillClrLst>
+    <dgm:linClrLst meth="repeat">
+      <a:schemeClr val="accent1">
+        <a:alpha val="90000"/>
+        <a:tint val="40000"/>
+      </a:schemeClr>
+    </dgm:linClrLst>
+    <dgm:effectClrLst/>
+    <dgm:txLinClrLst/>
+    <dgm:txFillClrLst meth="repeat">
+      <a:schemeClr val="dk1"/>
+    </dgm:txFillClrLst>
+    <dgm:txEffectClrLst/>
+  </dgm:styleLbl>
+  <dgm:styleLbl name="alignAccFollowNode1">
+    <dgm:fillClrLst meth="repeat">
+      <a:schemeClr val="accent1">
+        <a:alpha val="90000"/>
+        <a:tint val="40000"/>
+      </a:schemeClr>
+    </dgm:fillClrLst>
+    <dgm:linClrLst meth="repeat">
+      <a:schemeClr val="accent1">
+        <a:alpha val="90000"/>
+        <a:tint val="40000"/>
+      </a:schemeClr>
+    </dgm:linClrLst>
+    <dgm:effectClrLst/>
+    <dgm:txLinClrLst/>
+    <dgm:txFillClrLst meth="repeat">
+      <a:schemeClr val="dk1"/>
+    </dgm:txFillClrLst>
+    <dgm:txEffectClrLst/>
+  </dgm:styleLbl>
+  <dgm:styleLbl name="bgAccFollowNode1">
+    <dgm:fillClrLst meth="repeat">
+      <a:schemeClr val="accent1">
+        <a:alpha val="90000"/>
+        <a:tint val="40000"/>
+      </a:schemeClr>
+    </dgm:fillClrLst>
+    <dgm:linClrLst meth="repeat">
+      <a:schemeClr val="accent1">
+        <a:alpha val="90000"/>
+        <a:tint val="40000"/>
+      </a:schemeClr>
+    </dgm:linClrLst>
+    <dgm:effectClrLst/>
+    <dgm:txLinClrLst/>
+    <dgm:txFillClrLst meth="repeat">
+      <a:schemeClr val="dk1"/>
+    </dgm:txFillClrLst>
+    <dgm:txEffectClrLst/>
+  </dgm:styleLbl>
+  <dgm:styleLbl name="fgAcc0">
+    <dgm:fillClrLst meth="repeat">
+      <a:schemeClr val="lt1">
+        <a:alpha val="90000"/>
+      </a:schemeClr>
+    </dgm:fillClrLst>
+    <dgm:linClrLst meth="repeat">
+      <a:schemeClr val="accent1"/>
+    </dgm:linClrLst>
+    <dgm:effectClrLst/>
+    <dgm:txLinClrLst/>
+    <dgm:txFillClrLst meth="repeat">
+      <a:schemeClr val="dk1"/>
+    </dgm:txFillClrLst>
+    <dgm:txEffectClrLst/>
+  </dgm:styleLbl>
+  <dgm:styleLbl name="fgAcc2">
+    <dgm:fillClrLst meth="repeat">
+      <a:schemeClr val="lt1">
+        <a:alpha val="90000"/>
+      </a:schemeClr>
+    </dgm:fillClrLst>
+    <dgm:linClrLst meth="repeat">
+      <a:schemeClr val="accent1"/>
+    </dgm:linClrLst>
+    <dgm:effectClrLst/>
+    <dgm:txLinClrLst/>
+    <dgm:txFillClrLst meth="repeat">
+      <a:schemeClr val="dk1"/>
+    </dgm:txFillClrLst>
+    <dgm:txEffectClrLst/>
+  </dgm:styleLbl>
+  <dgm:styleLbl name="fgAcc3">
+    <dgm:fillClrLst meth="repeat">
+      <a:schemeClr val="lt1">
+        <a:alpha val="90000"/>
+      </a:schemeClr>
+    </dgm:fillClrLst>
+    <dgm:linClrLst meth="repeat">
+      <a:schemeClr val="accent1"/>
+    </dgm:linClrLst>
+    <dgm:effectClrLst/>
+    <dgm:txLinClrLst/>
+    <dgm:txFillClrLst meth="repeat">
+      <a:schemeClr val="dk1"/>
+    </dgm:txFillClrLst>
+    <dgm:txEffectClrLst/>
+  </dgm:styleLbl>
+  <dgm:styleLbl name="fgAcc4">
+    <dgm:fillClrLst meth="repeat">
+      <a:schemeClr val="lt1">
+        <a:alpha val="90000"/>
+      </a:schemeClr>
+    </dgm:fillClrLst>
+    <dgm:linClrLst meth="repeat">
+      <a:schemeClr val="accent1"/>
+    </dgm:linClrLst>
+    <dgm:effectClrLst/>
+    <dgm:txLinClrLst/>
+    <dgm:txFillClrLst meth="repeat">
+      <a:schemeClr val="dk1"/>
+    </dgm:txFillClrLst>
+    <dgm:txEffectClrLst/>
+  </dgm:styleLbl>
+  <dgm:styleLbl name="bgShp">
+    <dgm:fillClrLst meth="repeat">
+      <a:schemeClr val="accent1">
+        <a:tint val="40000"/>
+      </a:schemeClr>
+    </dgm:fillClrLst>
+    <dgm:linClrLst meth="repeat">
+      <a:schemeClr val="accent1"/>
+    </dgm:linClrLst>
+    <dgm:effectClrLst/>
+    <dgm:txLinClrLst/>
+    <dgm:txFillClrLst meth="repeat">
+      <a:schemeClr val="dk1"/>
+    </dgm:txFillClrLst>
+    <dgm:txEffectClrLst/>
+  </dgm:styleLbl>
+  <dgm:styleLbl name="dkBgShp">
+    <dgm:fillClrLst meth="repeat">
+      <a:schemeClr val="accent1">
+        <a:shade val="80000"/>
+      </a:schemeClr>
+    </dgm:fillClrLst>
+    <dgm:linClrLst meth="repeat">
+      <a:schemeClr val="accent1"/>
+    </dgm:linClrLst>
+    <dgm:effectClrLst/>
+    <dgm:txLinClrLst/>
+    <dgm:txFillClrLst meth="repeat">
+      <a:schemeClr val="lt1"/>
+    </dgm:txFillClrLst>
+    <dgm:txEffectClrLst/>
+  </dgm:styleLbl>
+  <dgm:styleLbl name="trBgShp">
+    <dgm:fillClrLst meth="repeat">
+      <a:schemeClr val="accent1">
+        <a:tint val="50000"/>
+        <a:alpha val="40000"/>
+      </a:schemeClr>
+    </dgm:fillClrLst>
+    <dgm:linClrLst meth="repeat">
+      <a:schemeClr val="accent1"/>
+    </dgm:linClrLst>
+    <dgm:effectClrLst/>
+    <dgm:txLinClrLst/>
+    <dgm:txFillClrLst meth="repeat">
+      <a:schemeClr val="lt1"/>
+    </dgm:txFillClrLst>
+    <dgm:txEffectClrLst/>
+  </dgm:styleLbl>
+  <dgm:styleLbl name="fgShp">
+    <dgm:fillClrLst meth="repeat">
+      <a:schemeClr val="accent1">
+        <a:tint val="60000"/>
+      </a:schemeClr>
+    </dgm:fillClrLst>
+    <dgm:linClrLst meth="repeat">
+      <a:schemeClr val="lt1"/>
+    </dgm:linClrLst>
+    <dgm:effectClrLst/>
+    <dgm:txLinClrLst/>
+    <dgm:txFillClrLst meth="repeat">
+      <a:schemeClr val="dk1"/>
+    </dgm:txFillClrLst>
+    <dgm:txEffectClrLst/>
+  </dgm:styleLbl>
+  <dgm:styleLbl name="revTx">
+    <dgm:fillClrLst meth="repeat">
+      <a:schemeClr val="lt1">
+        <a:alpha val="0"/>
+      </a:schemeClr>
+    </dgm:fillClrLst>
+    <dgm:linClrLst meth="repeat">
+      <a:schemeClr val="dk1">
+        <a:alpha val="0"/>
+      </a:schemeClr>
+    </dgm:linClrLst>
+    <dgm:effectClrLst/>
+    <dgm:txLinClrLst/>
+    <dgm:txFillClrLst meth="repeat">
+      <a:schemeClr val="tx1"/>
+    </dgm:txFillClrLst>
+    <dgm:txEffectClrLst/>
+  </dgm:styleLbl>
+</dgm:colorsDef>
+</file>
+
 <file path=ppt/diagrams/data1.xml><?xml version="1.0" encoding="utf-8"?>
+<dgm:dataModel xmlns:dgm="http://schemas.openxmlformats.org/drawingml/2006/diagram" xmlns:a="http://schemas.openxmlformats.org/drawingml/2006/main">
+  <dgm:ptLst>
+    <dgm:pt modelId="{3ACF6BD6-54A1-47AF-AF46-01F1A373DA45}" type="doc">
+      <dgm:prSet loTypeId="urn:microsoft.com/office/officeart/2005/8/layout/lProcess2" loCatId="list" qsTypeId="urn:microsoft.com/office/officeart/2005/8/quickstyle/simple1" qsCatId="simple" csTypeId="urn:microsoft.com/office/officeart/2005/8/colors/accent1_2" csCatId="accent1" phldr="1"/>
+      <dgm:spPr/>
+      <dgm:t>
+        <a:bodyPr/>
+        <a:lstStyle/>
+        <a:p>
+          <a:endParaRPr lang="en-US"/>
+        </a:p>
+      </dgm:t>
+    </dgm:pt>
+    <dgm:pt modelId="{D4D87B1B-F3CA-42BA-86F4-987644C7FA06}">
+      <dgm:prSet phldrT="[Text]"/>
+      <dgm:spPr/>
+      <dgm:t>
+        <a:bodyPr/>
+        <a:lstStyle/>
+        <a:p>
+          <a:r>
+            <a:rPr lang="en-US" dirty="0"/>
+            <a:t>Single agent pathfinding</a:t>
+          </a:r>
+        </a:p>
+      </dgm:t>
+    </dgm:pt>
+    <dgm:pt modelId="{A1BBFEC7-021B-4766-A63C-4409BE66C00E}" type="parTrans" cxnId="{4B48B5C2-0BDB-4D35-855B-59604C2EFC27}">
+      <dgm:prSet/>
+      <dgm:spPr/>
+      <dgm:t>
+        <a:bodyPr/>
+        <a:lstStyle/>
+        <a:p>
+          <a:endParaRPr lang="en-US"/>
+        </a:p>
+      </dgm:t>
+    </dgm:pt>
+    <dgm:pt modelId="{1D12FDB3-CF72-4716-A00D-6DF029953C5D}" type="sibTrans" cxnId="{4B48B5C2-0BDB-4D35-855B-59604C2EFC27}">
+      <dgm:prSet/>
+      <dgm:spPr/>
+      <dgm:t>
+        <a:bodyPr/>
+        <a:lstStyle/>
+        <a:p>
+          <a:endParaRPr lang="en-US"/>
+        </a:p>
+      </dgm:t>
+    </dgm:pt>
+    <dgm:pt modelId="{881B5BDE-2FCF-4F92-9F96-6882C31F1C9B}">
+      <dgm:prSet phldrT="[Text]"/>
+      <dgm:spPr/>
+      <dgm:t>
+        <a:bodyPr/>
+        <a:lstStyle/>
+        <a:p>
+          <a:r>
+            <a:rPr lang="en-US" dirty="0"/>
+            <a:t>Linear Programming</a:t>
+          </a:r>
+        </a:p>
+      </dgm:t>
+    </dgm:pt>
+    <dgm:pt modelId="{99952306-DE86-4C31-99B6-3A059F35CC5D}" type="parTrans" cxnId="{59C5865D-5B04-4B14-A2DB-670D58CB031C}">
+      <dgm:prSet/>
+      <dgm:spPr/>
+      <dgm:t>
+        <a:bodyPr/>
+        <a:lstStyle/>
+        <a:p>
+          <a:endParaRPr lang="en-US"/>
+        </a:p>
+      </dgm:t>
+    </dgm:pt>
+    <dgm:pt modelId="{8C2F8ABB-CAA8-4429-AC6E-F63C813DDFDB}" type="sibTrans" cxnId="{59C5865D-5B04-4B14-A2DB-670D58CB031C}">
+      <dgm:prSet/>
+      <dgm:spPr/>
+      <dgm:t>
+        <a:bodyPr/>
+        <a:lstStyle/>
+        <a:p>
+          <a:endParaRPr lang="en-US"/>
+        </a:p>
+      </dgm:t>
+    </dgm:pt>
+    <dgm:pt modelId="{CDE98578-3D95-4E0F-B23E-559D70CE71F6}">
+      <dgm:prSet phldrT="[Text]"/>
+      <dgm:spPr/>
+      <dgm:t>
+        <a:bodyPr/>
+        <a:lstStyle/>
+        <a:p>
+          <a:r>
+            <a:rPr lang="en-US" dirty="0"/>
+            <a:t>Branch and price</a:t>
+          </a:r>
+        </a:p>
+      </dgm:t>
+    </dgm:pt>
+    <dgm:pt modelId="{73CA378C-966B-4741-B2F2-0662529EF50A}" type="parTrans" cxnId="{682D2CF8-04CF-48E2-A7D5-DBFE82C52C56}">
+      <dgm:prSet/>
+      <dgm:spPr/>
+      <dgm:t>
+        <a:bodyPr/>
+        <a:lstStyle/>
+        <a:p>
+          <a:endParaRPr lang="en-US"/>
+        </a:p>
+      </dgm:t>
+    </dgm:pt>
+    <dgm:pt modelId="{11DB802B-58F6-40C3-8F08-7A888834A1FD}" type="sibTrans" cxnId="{682D2CF8-04CF-48E2-A7D5-DBFE82C52C56}">
+      <dgm:prSet/>
+      <dgm:spPr/>
+      <dgm:t>
+        <a:bodyPr/>
+        <a:lstStyle/>
+        <a:p>
+          <a:endParaRPr lang="en-US"/>
+        </a:p>
+      </dgm:t>
+    </dgm:pt>
+    <dgm:pt modelId="{7E158A03-45FE-4EB7-B3B7-9ABE516CDE45}">
+      <dgm:prSet phldrT="[Text]" phldr="1"/>
+      <dgm:spPr/>
+      <dgm:t>
+        <a:bodyPr/>
+        <a:lstStyle/>
+        <a:p>
+          <a:endParaRPr lang="en-US" dirty="0"/>
+        </a:p>
+      </dgm:t>
+    </dgm:pt>
+    <dgm:pt modelId="{79EFF172-726E-43D0-B55A-6EE6253894D4}" type="parTrans" cxnId="{585CEE1D-67DE-443E-ACC2-F05700C1208B}">
+      <dgm:prSet/>
+      <dgm:spPr/>
+      <dgm:t>
+        <a:bodyPr/>
+        <a:lstStyle/>
+        <a:p>
+          <a:endParaRPr lang="en-US"/>
+        </a:p>
+      </dgm:t>
+    </dgm:pt>
+    <dgm:pt modelId="{515417C1-C278-49C3-BFC8-74A6859318E6}" type="sibTrans" cxnId="{585CEE1D-67DE-443E-ACC2-F05700C1208B}">
+      <dgm:prSet/>
+      <dgm:spPr/>
+      <dgm:t>
+        <a:bodyPr/>
+        <a:lstStyle/>
+        <a:p>
+          <a:endParaRPr lang="en-US"/>
+        </a:p>
+      </dgm:t>
+    </dgm:pt>
+    <dgm:pt modelId="{060B9263-BF23-4D06-974F-11B04B42458B}">
+      <dgm:prSet/>
+      <dgm:spPr/>
+      <dgm:t>
+        <a:bodyPr/>
+        <a:lstStyle/>
+        <a:p>
+          <a:r>
+            <a:rPr lang="en-US" dirty="0"/>
+            <a:t>Jump Point Search</a:t>
+          </a:r>
+        </a:p>
+      </dgm:t>
+    </dgm:pt>
+    <dgm:pt modelId="{1CA4152A-8EB6-43F7-ACF6-689EE2BD8505}" type="parTrans" cxnId="{0E59D4AE-8E5F-4B13-B55D-937249A4DD96}">
+      <dgm:prSet/>
+      <dgm:spPr/>
+      <dgm:t>
+        <a:bodyPr/>
+        <a:lstStyle/>
+        <a:p>
+          <a:endParaRPr lang="en-US"/>
+        </a:p>
+      </dgm:t>
+    </dgm:pt>
+    <dgm:pt modelId="{7504E660-F841-46B8-A9A6-CDB7FF3640BE}" type="sibTrans" cxnId="{0E59D4AE-8E5F-4B13-B55D-937249A4DD96}">
+      <dgm:prSet/>
+      <dgm:spPr/>
+      <dgm:t>
+        <a:bodyPr/>
+        <a:lstStyle/>
+        <a:p>
+          <a:endParaRPr lang="en-US"/>
+        </a:p>
+      </dgm:t>
+    </dgm:pt>
+    <dgm:pt modelId="{4F820AE9-4DDF-4F90-8CE4-7E0780A80179}">
+      <dgm:prSet/>
+      <dgm:spPr/>
+      <dgm:t>
+        <a:bodyPr/>
+        <a:lstStyle/>
+        <a:p>
+          <a:r>
+            <a:rPr lang="en-US" dirty="0"/>
+            <a:t>Compressed Path Databases</a:t>
+          </a:r>
+        </a:p>
+      </dgm:t>
+    </dgm:pt>
+    <dgm:pt modelId="{CBBED21E-10D2-429D-AA73-FB360465131D}" type="parTrans" cxnId="{8A86CE38-F671-4267-8CAF-E416C48B6075}">
+      <dgm:prSet/>
+      <dgm:spPr/>
+      <dgm:t>
+        <a:bodyPr/>
+        <a:lstStyle/>
+        <a:p>
+          <a:endParaRPr lang="en-US"/>
+        </a:p>
+      </dgm:t>
+    </dgm:pt>
+    <dgm:pt modelId="{786B3747-85DA-411F-B513-B4315912F0A6}" type="sibTrans" cxnId="{8A86CE38-F671-4267-8CAF-E416C48B6075}">
+      <dgm:prSet/>
+      <dgm:spPr/>
+      <dgm:t>
+        <a:bodyPr/>
+        <a:lstStyle/>
+        <a:p>
+          <a:endParaRPr lang="en-US"/>
+        </a:p>
+      </dgm:t>
+    </dgm:pt>
+    <dgm:pt modelId="{81FB1B7A-C1EE-40A3-B515-FC0EB0A63D9B}" type="pres">
+      <dgm:prSet presAssocID="{3ACF6BD6-54A1-47AF-AF46-01F1A373DA45}" presName="theList" presStyleCnt="0">
+        <dgm:presLayoutVars>
+          <dgm:dir/>
+          <dgm:animLvl val="lvl"/>
+          <dgm:resizeHandles val="exact"/>
+        </dgm:presLayoutVars>
+      </dgm:prSet>
+      <dgm:spPr/>
+    </dgm:pt>
+    <dgm:pt modelId="{C0A23CF0-E960-4E9F-95EA-9BD6AF5DFE42}" type="pres">
+      <dgm:prSet presAssocID="{D4D87B1B-F3CA-42BA-86F4-987644C7FA06}" presName="compNode" presStyleCnt="0"/>
+      <dgm:spPr/>
+    </dgm:pt>
+    <dgm:pt modelId="{F4462BBD-30C6-49E7-AAFD-0A943821B7B0}" type="pres">
+      <dgm:prSet presAssocID="{D4D87B1B-F3CA-42BA-86F4-987644C7FA06}" presName="aNode" presStyleLbl="bgShp" presStyleIdx="0" presStyleCnt="2"/>
+      <dgm:spPr/>
+    </dgm:pt>
+    <dgm:pt modelId="{23A35880-CEBA-4852-9C56-0DC311806E9E}" type="pres">
+      <dgm:prSet presAssocID="{D4D87B1B-F3CA-42BA-86F4-987644C7FA06}" presName="textNode" presStyleLbl="bgShp" presStyleIdx="0" presStyleCnt="2"/>
+      <dgm:spPr/>
+    </dgm:pt>
+    <dgm:pt modelId="{3EE31ED7-6AE6-43E2-B8C1-C4BE98EBD8CF}" type="pres">
+      <dgm:prSet presAssocID="{D4D87B1B-F3CA-42BA-86F4-987644C7FA06}" presName="compChildNode" presStyleCnt="0"/>
+      <dgm:spPr/>
+    </dgm:pt>
+    <dgm:pt modelId="{31C266A4-EC4B-426E-9FBA-1F8E04CED95E}" type="pres">
+      <dgm:prSet presAssocID="{D4D87B1B-F3CA-42BA-86F4-987644C7FA06}" presName="theInnerList" presStyleCnt="0"/>
+      <dgm:spPr/>
+    </dgm:pt>
+    <dgm:pt modelId="{E7B05715-817C-4857-83F3-D69679AA25A2}" type="pres">
+      <dgm:prSet presAssocID="{060B9263-BF23-4D06-974F-11B04B42458B}" presName="childNode" presStyleLbl="node1" presStyleIdx="0" presStyleCnt="4">
+        <dgm:presLayoutVars>
+          <dgm:bulletEnabled val="1"/>
+        </dgm:presLayoutVars>
+      </dgm:prSet>
+      <dgm:spPr/>
+    </dgm:pt>
+    <dgm:pt modelId="{ADA2076A-DE27-4625-9BFF-977912CA40BF}" type="pres">
+      <dgm:prSet presAssocID="{060B9263-BF23-4D06-974F-11B04B42458B}" presName="aSpace2" presStyleCnt="0"/>
+      <dgm:spPr/>
+    </dgm:pt>
+    <dgm:pt modelId="{08377770-FC54-4915-A6FB-DE536902C015}" type="pres">
+      <dgm:prSet presAssocID="{4F820AE9-4DDF-4F90-8CE4-7E0780A80179}" presName="childNode" presStyleLbl="node1" presStyleIdx="1" presStyleCnt="4">
+        <dgm:presLayoutVars>
+          <dgm:bulletEnabled val="1"/>
+        </dgm:presLayoutVars>
+      </dgm:prSet>
+      <dgm:spPr/>
+    </dgm:pt>
+    <dgm:pt modelId="{A9141C98-B033-4DAC-9AA5-C83D3B1C0191}" type="pres">
+      <dgm:prSet presAssocID="{D4D87B1B-F3CA-42BA-86F4-987644C7FA06}" presName="aSpace" presStyleCnt="0"/>
+      <dgm:spPr/>
+    </dgm:pt>
+    <dgm:pt modelId="{BB89CD3C-7550-4983-BD71-D2D7CD48211A}" type="pres">
+      <dgm:prSet presAssocID="{881B5BDE-2FCF-4F92-9F96-6882C31F1C9B}" presName="compNode" presStyleCnt="0"/>
+      <dgm:spPr/>
+    </dgm:pt>
+    <dgm:pt modelId="{DC13A976-082C-4EC7-AF90-2BCD3C9ED867}" type="pres">
+      <dgm:prSet presAssocID="{881B5BDE-2FCF-4F92-9F96-6882C31F1C9B}" presName="aNode" presStyleLbl="bgShp" presStyleIdx="1" presStyleCnt="2"/>
+      <dgm:spPr/>
+    </dgm:pt>
+    <dgm:pt modelId="{756938AC-B276-4066-B393-D1288FEFC5BC}" type="pres">
+      <dgm:prSet presAssocID="{881B5BDE-2FCF-4F92-9F96-6882C31F1C9B}" presName="textNode" presStyleLbl="bgShp" presStyleIdx="1" presStyleCnt="2"/>
+      <dgm:spPr/>
+    </dgm:pt>
+    <dgm:pt modelId="{4E6B82AC-39AB-4138-9A7F-77EF92E39F10}" type="pres">
+      <dgm:prSet presAssocID="{881B5BDE-2FCF-4F92-9F96-6882C31F1C9B}" presName="compChildNode" presStyleCnt="0"/>
+      <dgm:spPr/>
+    </dgm:pt>
+    <dgm:pt modelId="{4ABE11E0-26B4-4351-AD49-6475D4A4E562}" type="pres">
+      <dgm:prSet presAssocID="{881B5BDE-2FCF-4F92-9F96-6882C31F1C9B}" presName="theInnerList" presStyleCnt="0"/>
+      <dgm:spPr/>
+    </dgm:pt>
+    <dgm:pt modelId="{289D60A9-FEAB-47BE-B8CC-EAEC96B93F05}" type="pres">
+      <dgm:prSet presAssocID="{CDE98578-3D95-4E0F-B23E-559D70CE71F6}" presName="childNode" presStyleLbl="node1" presStyleIdx="2" presStyleCnt="4">
+        <dgm:presLayoutVars>
+          <dgm:bulletEnabled val="1"/>
+        </dgm:presLayoutVars>
+      </dgm:prSet>
+      <dgm:spPr/>
+    </dgm:pt>
+    <dgm:pt modelId="{732E4BE9-947B-44F5-88CC-8E0504EF26D5}" type="pres">
+      <dgm:prSet presAssocID="{CDE98578-3D95-4E0F-B23E-559D70CE71F6}" presName="aSpace2" presStyleCnt="0"/>
+      <dgm:spPr/>
+    </dgm:pt>
+    <dgm:pt modelId="{39998FF3-5187-4880-A56F-20CA3016E3DE}" type="pres">
+      <dgm:prSet presAssocID="{7E158A03-45FE-4EB7-B3B7-9ABE516CDE45}" presName="childNode" presStyleLbl="node1" presStyleIdx="3" presStyleCnt="4">
+        <dgm:presLayoutVars>
+          <dgm:bulletEnabled val="1"/>
+        </dgm:presLayoutVars>
+      </dgm:prSet>
+      <dgm:spPr/>
+    </dgm:pt>
+  </dgm:ptLst>
+  <dgm:cxnLst>
+    <dgm:cxn modelId="{8A73F21B-19F7-4243-8BB0-10E6BC882223}" type="presOf" srcId="{D4D87B1B-F3CA-42BA-86F4-987644C7FA06}" destId="{F4462BBD-30C6-49E7-AAFD-0A943821B7B0}" srcOrd="0" destOrd="0" presId="urn:microsoft.com/office/officeart/2005/8/layout/lProcess2"/>
+    <dgm:cxn modelId="{585CEE1D-67DE-443E-ACC2-F05700C1208B}" srcId="{881B5BDE-2FCF-4F92-9F96-6882C31F1C9B}" destId="{7E158A03-45FE-4EB7-B3B7-9ABE516CDE45}" srcOrd="1" destOrd="0" parTransId="{79EFF172-726E-43D0-B55A-6EE6253894D4}" sibTransId="{515417C1-C278-49C3-BFC8-74A6859318E6}"/>
+    <dgm:cxn modelId="{8A86CE38-F671-4267-8CAF-E416C48B6075}" srcId="{D4D87B1B-F3CA-42BA-86F4-987644C7FA06}" destId="{4F820AE9-4DDF-4F90-8CE4-7E0780A80179}" srcOrd="1" destOrd="0" parTransId="{CBBED21E-10D2-429D-AA73-FB360465131D}" sibTransId="{786B3747-85DA-411F-B513-B4315912F0A6}"/>
+    <dgm:cxn modelId="{59C5865D-5B04-4B14-A2DB-670D58CB031C}" srcId="{3ACF6BD6-54A1-47AF-AF46-01F1A373DA45}" destId="{881B5BDE-2FCF-4F92-9F96-6882C31F1C9B}" srcOrd="1" destOrd="0" parTransId="{99952306-DE86-4C31-99B6-3A059F35CC5D}" sibTransId="{8C2F8ABB-CAA8-4429-AC6E-F63C813DDFDB}"/>
+    <dgm:cxn modelId="{A25FB988-0766-49BF-BE16-6121B3F16ABA}" type="presOf" srcId="{060B9263-BF23-4D06-974F-11B04B42458B}" destId="{E7B05715-817C-4857-83F3-D69679AA25A2}" srcOrd="0" destOrd="0" presId="urn:microsoft.com/office/officeart/2005/8/layout/lProcess2"/>
+    <dgm:cxn modelId="{F443918D-8E1C-4CA8-9836-E6752A6EA286}" type="presOf" srcId="{D4D87B1B-F3CA-42BA-86F4-987644C7FA06}" destId="{23A35880-CEBA-4852-9C56-0DC311806E9E}" srcOrd="1" destOrd="0" presId="urn:microsoft.com/office/officeart/2005/8/layout/lProcess2"/>
+    <dgm:cxn modelId="{C4675D9F-6C70-4D7F-9882-4F38EEEDCFCC}" type="presOf" srcId="{881B5BDE-2FCF-4F92-9F96-6882C31F1C9B}" destId="{DC13A976-082C-4EC7-AF90-2BCD3C9ED867}" srcOrd="0" destOrd="0" presId="urn:microsoft.com/office/officeart/2005/8/layout/lProcess2"/>
+    <dgm:cxn modelId="{0E59D4AE-8E5F-4B13-B55D-937249A4DD96}" srcId="{D4D87B1B-F3CA-42BA-86F4-987644C7FA06}" destId="{060B9263-BF23-4D06-974F-11B04B42458B}" srcOrd="0" destOrd="0" parTransId="{1CA4152A-8EB6-43F7-ACF6-689EE2BD8505}" sibTransId="{7504E660-F841-46B8-A9A6-CDB7FF3640BE}"/>
+    <dgm:cxn modelId="{E4083EB3-2B2B-41DE-84C4-0944B6A40064}" type="presOf" srcId="{4F820AE9-4DDF-4F90-8CE4-7E0780A80179}" destId="{08377770-FC54-4915-A6FB-DE536902C015}" srcOrd="0" destOrd="0" presId="urn:microsoft.com/office/officeart/2005/8/layout/lProcess2"/>
+    <dgm:cxn modelId="{4B48B5C2-0BDB-4D35-855B-59604C2EFC27}" srcId="{3ACF6BD6-54A1-47AF-AF46-01F1A373DA45}" destId="{D4D87B1B-F3CA-42BA-86F4-987644C7FA06}" srcOrd="0" destOrd="0" parTransId="{A1BBFEC7-021B-4766-A63C-4409BE66C00E}" sibTransId="{1D12FDB3-CF72-4716-A00D-6DF029953C5D}"/>
+    <dgm:cxn modelId="{31D616C6-3ED2-45AD-903E-CFFFC3A55274}" type="presOf" srcId="{CDE98578-3D95-4E0F-B23E-559D70CE71F6}" destId="{289D60A9-FEAB-47BE-B8CC-EAEC96B93F05}" srcOrd="0" destOrd="0" presId="urn:microsoft.com/office/officeart/2005/8/layout/lProcess2"/>
+    <dgm:cxn modelId="{545235DC-73CA-4BFC-83E2-86F4A7B0EDD0}" type="presOf" srcId="{881B5BDE-2FCF-4F92-9F96-6882C31F1C9B}" destId="{756938AC-B276-4066-B393-D1288FEFC5BC}" srcOrd="1" destOrd="0" presId="urn:microsoft.com/office/officeart/2005/8/layout/lProcess2"/>
+    <dgm:cxn modelId="{B22E9DF3-92BF-4E30-8FC3-B3C25A86AA26}" type="presOf" srcId="{3ACF6BD6-54A1-47AF-AF46-01F1A373DA45}" destId="{81FB1B7A-C1EE-40A3-B515-FC0EB0A63D9B}" srcOrd="0" destOrd="0" presId="urn:microsoft.com/office/officeart/2005/8/layout/lProcess2"/>
+    <dgm:cxn modelId="{682D2CF8-04CF-48E2-A7D5-DBFE82C52C56}" srcId="{881B5BDE-2FCF-4F92-9F96-6882C31F1C9B}" destId="{CDE98578-3D95-4E0F-B23E-559D70CE71F6}" srcOrd="0" destOrd="0" parTransId="{73CA378C-966B-4741-B2F2-0662529EF50A}" sibTransId="{11DB802B-58F6-40C3-8F08-7A888834A1FD}"/>
+    <dgm:cxn modelId="{0ECC7AFB-A697-473F-B47E-9BD9844E0CC7}" type="presOf" srcId="{7E158A03-45FE-4EB7-B3B7-9ABE516CDE45}" destId="{39998FF3-5187-4880-A56F-20CA3016E3DE}" srcOrd="0" destOrd="0" presId="urn:microsoft.com/office/officeart/2005/8/layout/lProcess2"/>
+    <dgm:cxn modelId="{CBDF5BAC-733A-4E86-AC11-2B77F3C6C3C1}" type="presParOf" srcId="{81FB1B7A-C1EE-40A3-B515-FC0EB0A63D9B}" destId="{C0A23CF0-E960-4E9F-95EA-9BD6AF5DFE42}" srcOrd="0" destOrd="0" presId="urn:microsoft.com/office/officeart/2005/8/layout/lProcess2"/>
+    <dgm:cxn modelId="{FC69E381-1C64-49C8-87DB-4946A9FE9FEA}" type="presParOf" srcId="{C0A23CF0-E960-4E9F-95EA-9BD6AF5DFE42}" destId="{F4462BBD-30C6-49E7-AAFD-0A943821B7B0}" srcOrd="0" destOrd="0" presId="urn:microsoft.com/office/officeart/2005/8/layout/lProcess2"/>
+    <dgm:cxn modelId="{23D750CC-7188-451A-86E0-F56B0CCF9CB9}" type="presParOf" srcId="{C0A23CF0-E960-4E9F-95EA-9BD6AF5DFE42}" destId="{23A35880-CEBA-4852-9C56-0DC311806E9E}" srcOrd="1" destOrd="0" presId="urn:microsoft.com/office/officeart/2005/8/layout/lProcess2"/>
+    <dgm:cxn modelId="{D007E4D1-0C4A-4527-AA88-C4A69416C56E}" type="presParOf" srcId="{C0A23CF0-E960-4E9F-95EA-9BD6AF5DFE42}" destId="{3EE31ED7-6AE6-43E2-B8C1-C4BE98EBD8CF}" srcOrd="2" destOrd="0" presId="urn:microsoft.com/office/officeart/2005/8/layout/lProcess2"/>
+    <dgm:cxn modelId="{2AEB6AA3-CB7A-4162-9B95-1644501316F3}" type="presParOf" srcId="{3EE31ED7-6AE6-43E2-B8C1-C4BE98EBD8CF}" destId="{31C266A4-EC4B-426E-9FBA-1F8E04CED95E}" srcOrd="0" destOrd="0" presId="urn:microsoft.com/office/officeart/2005/8/layout/lProcess2"/>
+    <dgm:cxn modelId="{47726850-56BF-4A67-B1CB-7B8049D88DD3}" type="presParOf" srcId="{31C266A4-EC4B-426E-9FBA-1F8E04CED95E}" destId="{E7B05715-817C-4857-83F3-D69679AA25A2}" srcOrd="0" destOrd="0" presId="urn:microsoft.com/office/officeart/2005/8/layout/lProcess2"/>
+    <dgm:cxn modelId="{0290EBF9-B6D2-4604-AB16-F7264E069041}" type="presParOf" srcId="{31C266A4-EC4B-426E-9FBA-1F8E04CED95E}" destId="{ADA2076A-DE27-4625-9BFF-977912CA40BF}" srcOrd="1" destOrd="0" presId="urn:microsoft.com/office/officeart/2005/8/layout/lProcess2"/>
+    <dgm:cxn modelId="{C3CC20CC-2B3E-4878-9EE5-DBCDE395A5D2}" type="presParOf" srcId="{31C266A4-EC4B-426E-9FBA-1F8E04CED95E}" destId="{08377770-FC54-4915-A6FB-DE536902C015}" srcOrd="2" destOrd="0" presId="urn:microsoft.com/office/officeart/2005/8/layout/lProcess2"/>
+    <dgm:cxn modelId="{D99810D7-A893-44AD-B80D-08EA1DF427E8}" type="presParOf" srcId="{81FB1B7A-C1EE-40A3-B515-FC0EB0A63D9B}" destId="{A9141C98-B033-4DAC-9AA5-C83D3B1C0191}" srcOrd="1" destOrd="0" presId="urn:microsoft.com/office/officeart/2005/8/layout/lProcess2"/>
+    <dgm:cxn modelId="{183F8BF5-2C59-4261-9953-6FBB2EF45311}" type="presParOf" srcId="{81FB1B7A-C1EE-40A3-B515-FC0EB0A63D9B}" destId="{BB89CD3C-7550-4983-BD71-D2D7CD48211A}" srcOrd="2" destOrd="0" presId="urn:microsoft.com/office/officeart/2005/8/layout/lProcess2"/>
+    <dgm:cxn modelId="{21F8E683-3037-46DF-8697-44E262DFE247}" type="presParOf" srcId="{BB89CD3C-7550-4983-BD71-D2D7CD48211A}" destId="{DC13A976-082C-4EC7-AF90-2BCD3C9ED867}" srcOrd="0" destOrd="0" presId="urn:microsoft.com/office/officeart/2005/8/layout/lProcess2"/>
+    <dgm:cxn modelId="{5135E9B2-3DCE-4B97-8337-72F6D3C2A30B}" type="presParOf" srcId="{BB89CD3C-7550-4983-BD71-D2D7CD48211A}" destId="{756938AC-B276-4066-B393-D1288FEFC5BC}" srcOrd="1" destOrd="0" presId="urn:microsoft.com/office/officeart/2005/8/layout/lProcess2"/>
+    <dgm:cxn modelId="{7A6C169B-D7DC-4905-91E6-1DD1950416E2}" type="presParOf" srcId="{BB89CD3C-7550-4983-BD71-D2D7CD48211A}" destId="{4E6B82AC-39AB-4138-9A7F-77EF92E39F10}" srcOrd="2" destOrd="0" presId="urn:microsoft.com/office/officeart/2005/8/layout/lProcess2"/>
+    <dgm:cxn modelId="{04C4FF23-F823-41F3-B5F5-BA61A55DD8E2}" type="presParOf" srcId="{4E6B82AC-39AB-4138-9A7F-77EF92E39F10}" destId="{4ABE11E0-26B4-4351-AD49-6475D4A4E562}" srcOrd="0" destOrd="0" presId="urn:microsoft.com/office/officeart/2005/8/layout/lProcess2"/>
+    <dgm:cxn modelId="{3B37AB44-E306-4F96-914A-ECB4117F1667}" type="presParOf" srcId="{4ABE11E0-26B4-4351-AD49-6475D4A4E562}" destId="{289D60A9-FEAB-47BE-B8CC-EAEC96B93F05}" srcOrd="0" destOrd="0" presId="urn:microsoft.com/office/officeart/2005/8/layout/lProcess2"/>
+    <dgm:cxn modelId="{D62F1656-71C1-4920-99AB-FD39FCA5084E}" type="presParOf" srcId="{4ABE11E0-26B4-4351-AD49-6475D4A4E562}" destId="{732E4BE9-947B-44F5-88CC-8E0504EF26D5}" srcOrd="1" destOrd="0" presId="urn:microsoft.com/office/officeart/2005/8/layout/lProcess2"/>
+    <dgm:cxn modelId="{E5105594-E2B1-441A-999F-2D5B24CF02C3}" type="presParOf" srcId="{4ABE11E0-26B4-4351-AD49-6475D4A4E562}" destId="{39998FF3-5187-4880-A56F-20CA3016E3DE}" srcOrd="2" destOrd="0" presId="urn:microsoft.com/office/officeart/2005/8/layout/lProcess2"/>
+  </dgm:cxnLst>
+  <dgm:bg/>
+  <dgm:whole/>
+  <dgm:extLst>
+    <a:ext uri="http://schemas.microsoft.com/office/drawing/2008/diagram">
+      <dsp:dataModelExt xmlns:dsp="http://schemas.microsoft.com/office/drawing/2008/diagram" relId="rId6" minVer="http://schemas.openxmlformats.org/drawingml/2006/diagram"/>
+    </a:ext>
+  </dgm:extLst>
+</dgm:dataModel>
+</file>
+
+<file path=ppt/diagrams/data2.xml><?xml version="1.0" encoding="utf-8"?>
 <dgm:dataModel xmlns:dgm="http://schemas.openxmlformats.org/drawingml/2006/diagram" xmlns:a="http://schemas.openxmlformats.org/drawingml/2006/main">
   <dgm:ptLst>
     <dgm:pt modelId="{18412894-D7A9-49D0-83AE-9F638CF4D69B}" type="doc">
@@ -2060,7 +3174,7 @@
 </dgm:dataModel>
 </file>
 
-<file path=ppt/diagrams/data2.xml><?xml version="1.0" encoding="utf-8"?>
+<file path=ppt/diagrams/data3.xml><?xml version="1.0" encoding="utf-8"?>
 <dgm:dataModel xmlns:dgm="http://schemas.openxmlformats.org/drawingml/2006/diagram" xmlns:a="http://schemas.openxmlformats.org/drawingml/2006/main">
   <dgm:ptLst>
     <dgm:pt modelId="{326983A9-107A-4921-834F-E9C9E9FF0DFA}" type="doc">
@@ -2567,6 +3681,471 @@
 </file>
 
 <file path=ppt/diagrams/drawing1.xml><?xml version="1.0" encoding="utf-8"?>
+<dsp:drawing xmlns:dgm="http://schemas.openxmlformats.org/drawingml/2006/diagram" xmlns:dsp="http://schemas.microsoft.com/office/drawing/2008/diagram" xmlns:a="http://schemas.openxmlformats.org/drawingml/2006/main">
+  <dsp:spTree>
+    <dsp:nvGrpSpPr>
+      <dsp:cNvPr id="0" name=""/>
+      <dsp:cNvGrpSpPr/>
+    </dsp:nvGrpSpPr>
+    <dsp:grpSpPr/>
+    <dsp:sp modelId="{F4462BBD-30C6-49E7-AAFD-0A943821B7B0}">
+      <dsp:nvSpPr>
+        <dsp:cNvPr id="0" name=""/>
+        <dsp:cNvSpPr/>
+      </dsp:nvSpPr>
+      <dsp:spPr>
+        <a:xfrm>
+          <a:off x="5282" y="0"/>
+          <a:ext cx="5081029" cy="3636963"/>
+        </a:xfrm>
+        <a:prstGeom prst="roundRect">
+          <a:avLst>
+            <a:gd name="adj" fmla="val 10000"/>
+          </a:avLst>
+        </a:prstGeom>
+        <a:solidFill>
+          <a:schemeClr val="accent1">
+            <a:tint val="40000"/>
+            <a:hueOff val="0"/>
+            <a:satOff val="0"/>
+            <a:lumOff val="0"/>
+            <a:alphaOff val="0"/>
+          </a:schemeClr>
+        </a:solidFill>
+        <a:ln>
+          <a:noFill/>
+        </a:ln>
+        <a:effectLst/>
+      </dsp:spPr>
+      <dsp:style>
+        <a:lnRef idx="0">
+          <a:scrgbClr r="0" g="0" b="0"/>
+        </a:lnRef>
+        <a:fillRef idx="1">
+          <a:scrgbClr r="0" g="0" b="0"/>
+        </a:fillRef>
+        <a:effectRef idx="0">
+          <a:scrgbClr r="0" g="0" b="0"/>
+        </a:effectRef>
+        <a:fontRef idx="minor"/>
+      </dsp:style>
+      <dsp:txBody>
+        <a:bodyPr spcFirstLastPara="0" vert="horz" wrap="square" lIns="137160" tIns="137160" rIns="137160" bIns="137160" numCol="1" spcCol="1270" anchor="ctr" anchorCtr="0">
+          <a:noAutofit/>
+        </a:bodyPr>
+        <a:lstStyle/>
+        <a:p>
+          <a:pPr marL="0" lvl="0" indent="0" algn="ctr" defTabSz="1600200">
+            <a:lnSpc>
+              <a:spcPct val="90000"/>
+            </a:lnSpc>
+            <a:spcBef>
+              <a:spcPct val="0"/>
+            </a:spcBef>
+            <a:spcAft>
+              <a:spcPct val="35000"/>
+            </a:spcAft>
+            <a:buNone/>
+          </a:pPr>
+          <a:r>
+            <a:rPr lang="en-US" sz="3600" kern="1200" dirty="0"/>
+            <a:t>Single agent pathfinding</a:t>
+          </a:r>
+        </a:p>
+      </dsp:txBody>
+      <dsp:txXfrm>
+        <a:off x="5282" y="0"/>
+        <a:ext cx="5081029" cy="1091088"/>
+      </dsp:txXfrm>
+    </dsp:sp>
+    <dsp:sp modelId="{E7B05715-817C-4857-83F3-D69679AA25A2}">
+      <dsp:nvSpPr>
+        <dsp:cNvPr id="0" name=""/>
+        <dsp:cNvSpPr/>
+      </dsp:nvSpPr>
+      <dsp:spPr>
+        <a:xfrm>
+          <a:off x="513384" y="1092154"/>
+          <a:ext cx="4064823" cy="1096594"/>
+        </a:xfrm>
+        <a:prstGeom prst="roundRect">
+          <a:avLst>
+            <a:gd name="adj" fmla="val 10000"/>
+          </a:avLst>
+        </a:prstGeom>
+        <a:solidFill>
+          <a:schemeClr val="accent1">
+            <a:hueOff val="0"/>
+            <a:satOff val="0"/>
+            <a:lumOff val="0"/>
+            <a:alphaOff val="0"/>
+          </a:schemeClr>
+        </a:solidFill>
+        <a:ln w="15875" cap="rnd" cmpd="sng" algn="ctr">
+          <a:solidFill>
+            <a:schemeClr val="lt1">
+              <a:hueOff val="0"/>
+              <a:satOff val="0"/>
+              <a:lumOff val="0"/>
+              <a:alphaOff val="0"/>
+            </a:schemeClr>
+          </a:solidFill>
+          <a:prstDash val="solid"/>
+        </a:ln>
+        <a:effectLst/>
+      </dsp:spPr>
+      <dsp:style>
+        <a:lnRef idx="2">
+          <a:scrgbClr r="0" g="0" b="0"/>
+        </a:lnRef>
+        <a:fillRef idx="1">
+          <a:scrgbClr r="0" g="0" b="0"/>
+        </a:fillRef>
+        <a:effectRef idx="0">
+          <a:scrgbClr r="0" g="0" b="0"/>
+        </a:effectRef>
+        <a:fontRef idx="minor">
+          <a:schemeClr val="lt1"/>
+        </a:fontRef>
+      </dsp:style>
+      <dsp:txBody>
+        <a:bodyPr spcFirstLastPara="0" vert="horz" wrap="square" lIns="81280" tIns="60960" rIns="81280" bIns="60960" numCol="1" spcCol="1270" anchor="ctr" anchorCtr="0">
+          <a:noAutofit/>
+        </a:bodyPr>
+        <a:lstStyle/>
+        <a:p>
+          <a:pPr marL="0" lvl="0" indent="0" algn="ctr" defTabSz="1422400">
+            <a:lnSpc>
+              <a:spcPct val="90000"/>
+            </a:lnSpc>
+            <a:spcBef>
+              <a:spcPct val="0"/>
+            </a:spcBef>
+            <a:spcAft>
+              <a:spcPct val="35000"/>
+            </a:spcAft>
+            <a:buNone/>
+          </a:pPr>
+          <a:r>
+            <a:rPr lang="en-US" sz="3200" kern="1200" dirty="0"/>
+            <a:t>Jump Point Search</a:t>
+          </a:r>
+        </a:p>
+      </dsp:txBody>
+      <dsp:txXfrm>
+        <a:off x="545502" y="1124272"/>
+        <a:ext cx="4000587" cy="1032358"/>
+      </dsp:txXfrm>
+    </dsp:sp>
+    <dsp:sp modelId="{08377770-FC54-4915-A6FB-DE536902C015}">
+      <dsp:nvSpPr>
+        <dsp:cNvPr id="0" name=""/>
+        <dsp:cNvSpPr/>
+      </dsp:nvSpPr>
+      <dsp:spPr>
+        <a:xfrm>
+          <a:off x="513384" y="2357455"/>
+          <a:ext cx="4064823" cy="1096594"/>
+        </a:xfrm>
+        <a:prstGeom prst="roundRect">
+          <a:avLst>
+            <a:gd name="adj" fmla="val 10000"/>
+          </a:avLst>
+        </a:prstGeom>
+        <a:solidFill>
+          <a:schemeClr val="accent1">
+            <a:hueOff val="0"/>
+            <a:satOff val="0"/>
+            <a:lumOff val="0"/>
+            <a:alphaOff val="0"/>
+          </a:schemeClr>
+        </a:solidFill>
+        <a:ln w="15875" cap="rnd" cmpd="sng" algn="ctr">
+          <a:solidFill>
+            <a:schemeClr val="lt1">
+              <a:hueOff val="0"/>
+              <a:satOff val="0"/>
+              <a:lumOff val="0"/>
+              <a:alphaOff val="0"/>
+            </a:schemeClr>
+          </a:solidFill>
+          <a:prstDash val="solid"/>
+        </a:ln>
+        <a:effectLst/>
+      </dsp:spPr>
+      <dsp:style>
+        <a:lnRef idx="2">
+          <a:scrgbClr r="0" g="0" b="0"/>
+        </a:lnRef>
+        <a:fillRef idx="1">
+          <a:scrgbClr r="0" g="0" b="0"/>
+        </a:fillRef>
+        <a:effectRef idx="0">
+          <a:scrgbClr r="0" g="0" b="0"/>
+        </a:effectRef>
+        <a:fontRef idx="minor">
+          <a:schemeClr val="lt1"/>
+        </a:fontRef>
+      </dsp:style>
+      <dsp:txBody>
+        <a:bodyPr spcFirstLastPara="0" vert="horz" wrap="square" lIns="81280" tIns="60960" rIns="81280" bIns="60960" numCol="1" spcCol="1270" anchor="ctr" anchorCtr="0">
+          <a:noAutofit/>
+        </a:bodyPr>
+        <a:lstStyle/>
+        <a:p>
+          <a:pPr marL="0" lvl="0" indent="0" algn="ctr" defTabSz="1422400">
+            <a:lnSpc>
+              <a:spcPct val="90000"/>
+            </a:lnSpc>
+            <a:spcBef>
+              <a:spcPct val="0"/>
+            </a:spcBef>
+            <a:spcAft>
+              <a:spcPct val="35000"/>
+            </a:spcAft>
+            <a:buNone/>
+          </a:pPr>
+          <a:r>
+            <a:rPr lang="en-US" sz="3200" kern="1200" dirty="0"/>
+            <a:t>Compressed Path Databases</a:t>
+          </a:r>
+        </a:p>
+      </dsp:txBody>
+      <dsp:txXfrm>
+        <a:off x="545502" y="2389573"/>
+        <a:ext cx="4000587" cy="1032358"/>
+      </dsp:txXfrm>
+    </dsp:sp>
+    <dsp:sp modelId="{DC13A976-082C-4EC7-AF90-2BCD3C9ED867}">
+      <dsp:nvSpPr>
+        <dsp:cNvPr id="0" name=""/>
+        <dsp:cNvSpPr/>
+      </dsp:nvSpPr>
+      <dsp:spPr>
+        <a:xfrm>
+          <a:off x="5467388" y="0"/>
+          <a:ext cx="5081029" cy="3636963"/>
+        </a:xfrm>
+        <a:prstGeom prst="roundRect">
+          <a:avLst>
+            <a:gd name="adj" fmla="val 10000"/>
+          </a:avLst>
+        </a:prstGeom>
+        <a:solidFill>
+          <a:schemeClr val="accent1">
+            <a:tint val="40000"/>
+            <a:hueOff val="0"/>
+            <a:satOff val="0"/>
+            <a:lumOff val="0"/>
+            <a:alphaOff val="0"/>
+          </a:schemeClr>
+        </a:solidFill>
+        <a:ln>
+          <a:noFill/>
+        </a:ln>
+        <a:effectLst/>
+      </dsp:spPr>
+      <dsp:style>
+        <a:lnRef idx="0">
+          <a:scrgbClr r="0" g="0" b="0"/>
+        </a:lnRef>
+        <a:fillRef idx="1">
+          <a:scrgbClr r="0" g="0" b="0"/>
+        </a:fillRef>
+        <a:effectRef idx="0">
+          <a:scrgbClr r="0" g="0" b="0"/>
+        </a:effectRef>
+        <a:fontRef idx="minor"/>
+      </dsp:style>
+      <dsp:txBody>
+        <a:bodyPr spcFirstLastPara="0" vert="horz" wrap="square" lIns="137160" tIns="137160" rIns="137160" bIns="137160" numCol="1" spcCol="1270" anchor="ctr" anchorCtr="0">
+          <a:noAutofit/>
+        </a:bodyPr>
+        <a:lstStyle/>
+        <a:p>
+          <a:pPr marL="0" lvl="0" indent="0" algn="ctr" defTabSz="1600200">
+            <a:lnSpc>
+              <a:spcPct val="90000"/>
+            </a:lnSpc>
+            <a:spcBef>
+              <a:spcPct val="0"/>
+            </a:spcBef>
+            <a:spcAft>
+              <a:spcPct val="35000"/>
+            </a:spcAft>
+            <a:buNone/>
+          </a:pPr>
+          <a:r>
+            <a:rPr lang="en-US" sz="3600" kern="1200" dirty="0"/>
+            <a:t>Linear Programming</a:t>
+          </a:r>
+        </a:p>
+      </dsp:txBody>
+      <dsp:txXfrm>
+        <a:off x="5467388" y="0"/>
+        <a:ext cx="5081029" cy="1091088"/>
+      </dsp:txXfrm>
+    </dsp:sp>
+    <dsp:sp modelId="{289D60A9-FEAB-47BE-B8CC-EAEC96B93F05}">
+      <dsp:nvSpPr>
+        <dsp:cNvPr id="0" name=""/>
+        <dsp:cNvSpPr/>
+      </dsp:nvSpPr>
+      <dsp:spPr>
+        <a:xfrm>
+          <a:off x="5975491" y="1092154"/>
+          <a:ext cx="4064823" cy="1096594"/>
+        </a:xfrm>
+        <a:prstGeom prst="roundRect">
+          <a:avLst>
+            <a:gd name="adj" fmla="val 10000"/>
+          </a:avLst>
+        </a:prstGeom>
+        <a:solidFill>
+          <a:schemeClr val="accent1">
+            <a:hueOff val="0"/>
+            <a:satOff val="0"/>
+            <a:lumOff val="0"/>
+            <a:alphaOff val="0"/>
+          </a:schemeClr>
+        </a:solidFill>
+        <a:ln w="15875" cap="rnd" cmpd="sng" algn="ctr">
+          <a:solidFill>
+            <a:schemeClr val="lt1">
+              <a:hueOff val="0"/>
+              <a:satOff val="0"/>
+              <a:lumOff val="0"/>
+              <a:alphaOff val="0"/>
+            </a:schemeClr>
+          </a:solidFill>
+          <a:prstDash val="solid"/>
+        </a:ln>
+        <a:effectLst/>
+      </dsp:spPr>
+      <dsp:style>
+        <a:lnRef idx="2">
+          <a:scrgbClr r="0" g="0" b="0"/>
+        </a:lnRef>
+        <a:fillRef idx="1">
+          <a:scrgbClr r="0" g="0" b="0"/>
+        </a:fillRef>
+        <a:effectRef idx="0">
+          <a:scrgbClr r="0" g="0" b="0"/>
+        </a:effectRef>
+        <a:fontRef idx="minor">
+          <a:schemeClr val="lt1"/>
+        </a:fontRef>
+      </dsp:style>
+      <dsp:txBody>
+        <a:bodyPr spcFirstLastPara="0" vert="horz" wrap="square" lIns="81280" tIns="60960" rIns="81280" bIns="60960" numCol="1" spcCol="1270" anchor="ctr" anchorCtr="0">
+          <a:noAutofit/>
+        </a:bodyPr>
+        <a:lstStyle/>
+        <a:p>
+          <a:pPr marL="0" lvl="0" indent="0" algn="ctr" defTabSz="1422400">
+            <a:lnSpc>
+              <a:spcPct val="90000"/>
+            </a:lnSpc>
+            <a:spcBef>
+              <a:spcPct val="0"/>
+            </a:spcBef>
+            <a:spcAft>
+              <a:spcPct val="35000"/>
+            </a:spcAft>
+            <a:buNone/>
+          </a:pPr>
+          <a:r>
+            <a:rPr lang="en-US" sz="3200" kern="1200" dirty="0"/>
+            <a:t>Branch and price</a:t>
+          </a:r>
+        </a:p>
+      </dsp:txBody>
+      <dsp:txXfrm>
+        <a:off x="6007609" y="1124272"/>
+        <a:ext cx="4000587" cy="1032358"/>
+      </dsp:txXfrm>
+    </dsp:sp>
+    <dsp:sp modelId="{39998FF3-5187-4880-A56F-20CA3016E3DE}">
+      <dsp:nvSpPr>
+        <dsp:cNvPr id="0" name=""/>
+        <dsp:cNvSpPr/>
+      </dsp:nvSpPr>
+      <dsp:spPr>
+        <a:xfrm>
+          <a:off x="5975491" y="2357455"/>
+          <a:ext cx="4064823" cy="1096594"/>
+        </a:xfrm>
+        <a:prstGeom prst="roundRect">
+          <a:avLst>
+            <a:gd name="adj" fmla="val 10000"/>
+          </a:avLst>
+        </a:prstGeom>
+        <a:solidFill>
+          <a:schemeClr val="accent1">
+            <a:hueOff val="0"/>
+            <a:satOff val="0"/>
+            <a:lumOff val="0"/>
+            <a:alphaOff val="0"/>
+          </a:schemeClr>
+        </a:solidFill>
+        <a:ln w="15875" cap="rnd" cmpd="sng" algn="ctr">
+          <a:solidFill>
+            <a:schemeClr val="lt1">
+              <a:hueOff val="0"/>
+              <a:satOff val="0"/>
+              <a:lumOff val="0"/>
+              <a:alphaOff val="0"/>
+            </a:schemeClr>
+          </a:solidFill>
+          <a:prstDash val="solid"/>
+        </a:ln>
+        <a:effectLst/>
+      </dsp:spPr>
+      <dsp:style>
+        <a:lnRef idx="2">
+          <a:scrgbClr r="0" g="0" b="0"/>
+        </a:lnRef>
+        <a:fillRef idx="1">
+          <a:scrgbClr r="0" g="0" b="0"/>
+        </a:fillRef>
+        <a:effectRef idx="0">
+          <a:scrgbClr r="0" g="0" b="0"/>
+        </a:effectRef>
+        <a:fontRef idx="minor">
+          <a:schemeClr val="lt1"/>
+        </a:fontRef>
+      </dsp:style>
+      <dsp:txBody>
+        <a:bodyPr spcFirstLastPara="0" vert="horz" wrap="square" lIns="81280" tIns="60960" rIns="81280" bIns="60960" numCol="1" spcCol="1270" anchor="ctr" anchorCtr="0">
+          <a:noAutofit/>
+        </a:bodyPr>
+        <a:lstStyle/>
+        <a:p>
+          <a:pPr marL="0" lvl="0" indent="0" algn="ctr" defTabSz="1422400">
+            <a:lnSpc>
+              <a:spcPct val="90000"/>
+            </a:lnSpc>
+            <a:spcBef>
+              <a:spcPct val="0"/>
+            </a:spcBef>
+            <a:spcAft>
+              <a:spcPct val="35000"/>
+            </a:spcAft>
+            <a:buNone/>
+          </a:pPr>
+          <a:endParaRPr lang="en-US" sz="3200" kern="1200" dirty="0"/>
+        </a:p>
+      </dsp:txBody>
+      <dsp:txXfrm>
+        <a:off x="6007609" y="2389573"/>
+        <a:ext cx="4000587" cy="1032358"/>
+      </dsp:txXfrm>
+    </dsp:sp>
+  </dsp:spTree>
+</dsp:drawing>
+</file>
+
+<file path=ppt/diagrams/drawing2.xml><?xml version="1.0" encoding="utf-8"?>
 <dsp:drawing xmlns:dgm="http://schemas.openxmlformats.org/drawingml/2006/diagram" xmlns:dsp="http://schemas.microsoft.com/office/drawing/2008/diagram" xmlns:a="http://schemas.openxmlformats.org/drawingml/2006/main">
   <dsp:spTree>
     <dsp:nvGrpSpPr>
@@ -3204,7 +4783,7 @@
 </dsp:drawing>
 </file>
 
-<file path=ppt/diagrams/drawing2.xml><?xml version="1.0" encoding="utf-8"?>
+<file path=ppt/diagrams/drawing3.xml><?xml version="1.0" encoding="utf-8"?>
 <dsp:drawing xmlns:dgm="http://schemas.openxmlformats.org/drawingml/2006/diagram" xmlns:dsp="http://schemas.microsoft.com/office/drawing/2008/diagram" xmlns:a="http://schemas.openxmlformats.org/drawingml/2006/main">
   <dsp:spTree>
     <dsp:nvGrpSpPr>
@@ -3923,6 +5502,233 @@
 </file>
 
 <file path=ppt/diagrams/layout1.xml><?xml version="1.0" encoding="utf-8"?>
+<dgm:layoutDef xmlns:dgm="http://schemas.openxmlformats.org/drawingml/2006/diagram" xmlns:a="http://schemas.openxmlformats.org/drawingml/2006/main" uniqueId="urn:microsoft.com/office/officeart/2005/8/layout/lProcess2">
+  <dgm:title val=""/>
+  <dgm:desc val=""/>
+  <dgm:catLst>
+    <dgm:cat type="list" pri="10000"/>
+    <dgm:cat type="relationship" pri="13000"/>
+  </dgm:catLst>
+  <dgm:sampData>
+    <dgm:dataModel>
+      <dgm:ptLst>
+        <dgm:pt modelId="0" type="doc"/>
+        <dgm:pt modelId="1">
+          <dgm:prSet phldr="1"/>
+        </dgm:pt>
+        <dgm:pt modelId="11">
+          <dgm:prSet phldr="1"/>
+        </dgm:pt>
+        <dgm:pt modelId="12">
+          <dgm:prSet phldr="1"/>
+        </dgm:pt>
+        <dgm:pt modelId="2">
+          <dgm:prSet phldr="1"/>
+        </dgm:pt>
+        <dgm:pt modelId="21">
+          <dgm:prSet phldr="1"/>
+        </dgm:pt>
+        <dgm:pt modelId="22">
+          <dgm:prSet phldr="1"/>
+        </dgm:pt>
+        <dgm:pt modelId="3">
+          <dgm:prSet phldr="1"/>
+        </dgm:pt>
+        <dgm:pt modelId="31">
+          <dgm:prSet phldr="1"/>
+        </dgm:pt>
+        <dgm:pt modelId="32">
+          <dgm:prSet phldr="1"/>
+        </dgm:pt>
+      </dgm:ptLst>
+      <dgm:cxnLst>
+        <dgm:cxn modelId="4" srcId="0" destId="1" srcOrd="0" destOrd="0"/>
+        <dgm:cxn modelId="5" srcId="0" destId="2" srcOrd="1" destOrd="0"/>
+        <dgm:cxn modelId="13" srcId="1" destId="11" srcOrd="0" destOrd="0"/>
+        <dgm:cxn modelId="14" srcId="1" destId="12" srcOrd="0" destOrd="0"/>
+        <dgm:cxn modelId="23" srcId="2" destId="21" srcOrd="0" destOrd="0"/>
+        <dgm:cxn modelId="24" srcId="2" destId="22" srcOrd="0" destOrd="0"/>
+        <dgm:cxn modelId="33" srcId="3" destId="31" srcOrd="0" destOrd="0"/>
+        <dgm:cxn modelId="34" srcId="3" destId="32" srcOrd="0" destOrd="0"/>
+      </dgm:cxnLst>
+      <dgm:bg/>
+      <dgm:whole/>
+    </dgm:dataModel>
+  </dgm:sampData>
+  <dgm:styleData useDef="1">
+    <dgm:dataModel>
+      <dgm:ptLst/>
+      <dgm:bg/>
+      <dgm:whole/>
+    </dgm:dataModel>
+  </dgm:styleData>
+  <dgm:clrData useDef="1">
+    <dgm:dataModel>
+      <dgm:ptLst/>
+      <dgm:bg/>
+      <dgm:whole/>
+    </dgm:dataModel>
+  </dgm:clrData>
+  <dgm:layoutNode name="theList">
+    <dgm:varLst>
+      <dgm:dir/>
+      <dgm:animLvl val="lvl"/>
+      <dgm:resizeHandles val="exact"/>
+    </dgm:varLst>
+    <dgm:choose name="Name0">
+      <dgm:if name="Name1" func="var" arg="dir" op="equ" val="norm">
+        <dgm:alg type="lin"/>
+      </dgm:if>
+      <dgm:else name="Name2">
+        <dgm:alg type="lin">
+          <dgm:param type="linDir" val="fromR"/>
+        </dgm:alg>
+      </dgm:else>
+    </dgm:choose>
+    <dgm:shape xmlns:r="http://schemas.openxmlformats.org/officeDocument/2006/relationships" r:blip="">
+      <dgm:adjLst/>
+    </dgm:shape>
+    <dgm:presOf/>
+    <dgm:constrLst>
+      <dgm:constr type="w" for="ch" forName="compNode" refType="w"/>
+      <dgm:constr type="h" for="ch" forName="compNode" refType="h"/>
+      <dgm:constr type="w" for="ch" forName="aSpace" refType="w" fact="0.075"/>
+      <dgm:constr type="h" for="des" forName="aSpace2" refType="h" fact="0.1"/>
+      <dgm:constr type="primFontSz" for="des" forName="textNode" op="equ"/>
+      <dgm:constr type="primFontSz" for="des" forName="childNode" op="equ"/>
+    </dgm:constrLst>
+    <dgm:ruleLst/>
+    <dgm:forEach name="aNodeForEach" axis="ch" ptType="node">
+      <dgm:layoutNode name="compNode">
+        <dgm:alg type="composite"/>
+        <dgm:shape xmlns:r="http://schemas.openxmlformats.org/officeDocument/2006/relationships" r:blip="">
+          <dgm:adjLst/>
+        </dgm:shape>
+        <dgm:presOf/>
+        <dgm:constrLst>
+          <dgm:constr type="w" for="ch" forName="aNode" refType="w"/>
+          <dgm:constr type="h" for="ch" forName="aNode" refType="h"/>
+          <dgm:constr type="w" for="ch" forName="textNode" refType="w"/>
+          <dgm:constr type="h" for="ch" forName="textNode" refType="h" fact="0.3"/>
+          <dgm:constr type="ctrX" for="ch" forName="textNode" refType="w" fact="0.5"/>
+          <dgm:constr type="w" for="ch" forName="compChildNode" refType="w" fact="0.8"/>
+          <dgm:constr type="h" for="ch" forName="compChildNode" refType="h" fact="0.65"/>
+          <dgm:constr type="t" for="ch" forName="compChildNode" refType="h" fact="0.3"/>
+          <dgm:constr type="ctrX" for="ch" forName="compChildNode" refType="w" fact="0.5"/>
+        </dgm:constrLst>
+        <dgm:ruleLst/>
+        <dgm:layoutNode name="aNode" styleLbl="bgShp">
+          <dgm:alg type="sp"/>
+          <dgm:shape xmlns:r="http://schemas.openxmlformats.org/officeDocument/2006/relationships" type="roundRect" r:blip="">
+            <dgm:adjLst>
+              <dgm:adj idx="1" val="0.1"/>
+            </dgm:adjLst>
+          </dgm:shape>
+          <dgm:presOf axis="self"/>
+          <dgm:constrLst/>
+          <dgm:ruleLst/>
+        </dgm:layoutNode>
+        <dgm:layoutNode name="textNode" styleLbl="bgShp">
+          <dgm:alg type="tx"/>
+          <dgm:shape xmlns:r="http://schemas.openxmlformats.org/officeDocument/2006/relationships" type="rect" r:blip="" hideGeom="1">
+            <dgm:adjLst>
+              <dgm:adj idx="1" val="0.1"/>
+            </dgm:adjLst>
+          </dgm:shape>
+          <dgm:presOf axis="self"/>
+          <dgm:constrLst>
+            <dgm:constr type="primFontSz" val="65"/>
+            <dgm:constr type="lMarg" refType="primFontSz" fact="0.3"/>
+            <dgm:constr type="rMarg" refType="primFontSz" fact="0.3"/>
+            <dgm:constr type="tMarg" refType="primFontSz" fact="0.3"/>
+            <dgm:constr type="bMarg" refType="primFontSz" fact="0.3"/>
+          </dgm:constrLst>
+          <dgm:ruleLst>
+            <dgm:rule type="primFontSz" val="5" fact="NaN" max="NaN"/>
+          </dgm:ruleLst>
+        </dgm:layoutNode>
+        <dgm:layoutNode name="compChildNode">
+          <dgm:alg type="composite"/>
+          <dgm:shape xmlns:r="http://schemas.openxmlformats.org/officeDocument/2006/relationships" r:blip="">
+            <dgm:adjLst/>
+          </dgm:shape>
+          <dgm:presOf/>
+          <dgm:constrLst>
+            <dgm:constr type="w" for="des" forName="childNode" refType="w"/>
+            <dgm:constr type="h" for="des" forName="childNode" refType="h"/>
+          </dgm:constrLst>
+          <dgm:ruleLst/>
+          <dgm:layoutNode name="theInnerList">
+            <dgm:alg type="lin">
+              <dgm:param type="linDir" val="fromT"/>
+            </dgm:alg>
+            <dgm:shape xmlns:r="http://schemas.openxmlformats.org/officeDocument/2006/relationships" r:blip="">
+              <dgm:adjLst/>
+            </dgm:shape>
+            <dgm:presOf/>
+            <dgm:constrLst/>
+            <dgm:ruleLst/>
+            <dgm:forEach name="childNodeForEach" axis="ch" ptType="node">
+              <dgm:layoutNode name="childNode" styleLbl="node1">
+                <dgm:varLst>
+                  <dgm:bulletEnabled val="1"/>
+                </dgm:varLst>
+                <dgm:alg type="tx"/>
+                <dgm:shape xmlns:r="http://schemas.openxmlformats.org/officeDocument/2006/relationships" type="roundRect" r:blip="">
+                  <dgm:adjLst>
+                    <dgm:adj idx="1" val="0.1"/>
+                  </dgm:adjLst>
+                </dgm:shape>
+                <dgm:presOf axis="desOrSelf" ptType="node"/>
+                <dgm:constrLst>
+                  <dgm:constr type="primFontSz" val="65"/>
+                  <dgm:constr type="tMarg" refType="primFontSz" fact="0.15"/>
+                  <dgm:constr type="bMarg" refType="primFontSz" fact="0.15"/>
+                  <dgm:constr type="lMarg" refType="primFontSz" fact="0.2"/>
+                  <dgm:constr type="rMarg" refType="primFontSz" fact="0.2"/>
+                </dgm:constrLst>
+                <dgm:ruleLst>
+                  <dgm:rule type="primFontSz" val="5" fact="NaN" max="NaN"/>
+                </dgm:ruleLst>
+              </dgm:layoutNode>
+              <dgm:choose name="Name3">
+                <dgm:if name="Name4" axis="self" ptType="node" func="revPos" op="equ" val="1"/>
+                <dgm:else name="Name5">
+                  <dgm:layoutNode name="aSpace2">
+                    <dgm:alg type="sp"/>
+                    <dgm:shape xmlns:r="http://schemas.openxmlformats.org/officeDocument/2006/relationships" r:blip="">
+                      <dgm:adjLst/>
+                    </dgm:shape>
+                    <dgm:presOf/>
+                    <dgm:constrLst/>
+                    <dgm:ruleLst/>
+                  </dgm:layoutNode>
+                </dgm:else>
+              </dgm:choose>
+            </dgm:forEach>
+          </dgm:layoutNode>
+        </dgm:layoutNode>
+      </dgm:layoutNode>
+      <dgm:choose name="Name6">
+        <dgm:if name="Name7" axis="self" ptType="node" func="revPos" op="equ" val="1"/>
+        <dgm:else name="Name8">
+          <dgm:layoutNode name="aSpace">
+            <dgm:alg type="sp"/>
+            <dgm:shape xmlns:r="http://schemas.openxmlformats.org/officeDocument/2006/relationships" r:blip="">
+              <dgm:adjLst/>
+            </dgm:shape>
+            <dgm:presOf/>
+            <dgm:constrLst/>
+            <dgm:ruleLst/>
+          </dgm:layoutNode>
+        </dgm:else>
+      </dgm:choose>
+    </dgm:forEach>
+  </dgm:layoutNode>
+</dgm:layoutDef>
+</file>
+
+<file path=ppt/diagrams/layout2.xml><?xml version="1.0" encoding="utf-8"?>
 <dgm:layoutDef xmlns:dgm="http://schemas.openxmlformats.org/drawingml/2006/diagram" xmlns:a="http://schemas.openxmlformats.org/drawingml/2006/main" uniqueId="urn:microsoft.com/office/officeart/2005/8/layout/lProcess3">
   <dgm:title val=""/>
   <dgm:desc val=""/>
@@ -4203,7 +6009,7 @@
 </dgm:layoutDef>
 </file>
 
-<file path=ppt/diagrams/layout2.xml><?xml version="1.0" encoding="utf-8"?>
+<file path=ppt/diagrams/layout3.xml><?xml version="1.0" encoding="utf-8"?>
 <dgm:layoutDef xmlns:dgm="http://schemas.openxmlformats.org/drawingml/2006/diagram" xmlns:a="http://schemas.openxmlformats.org/drawingml/2006/main" uniqueId="urn:microsoft.com/office/officeart/2005/8/layout/lProcess3">
   <dgm:title val=""/>
   <dgm:desc val=""/>
@@ -6552,6 +8358,1040 @@
 </dgm:styleDef>
 </file>
 
+<file path=ppt/diagrams/quickStyle3.xml><?xml version="1.0" encoding="utf-8"?>
+<dgm:styleDef xmlns:dgm="http://schemas.openxmlformats.org/drawingml/2006/diagram" xmlns:a="http://schemas.openxmlformats.org/drawingml/2006/main" uniqueId="urn:microsoft.com/office/officeart/2005/8/quickstyle/simple1">
+  <dgm:title val=""/>
+  <dgm:desc val=""/>
+  <dgm:catLst>
+    <dgm:cat type="simple" pri="10100"/>
+  </dgm:catLst>
+  <dgm:scene3d>
+    <a:camera prst="orthographicFront"/>
+    <a:lightRig rig="threePt" dir="t"/>
+  </dgm:scene3d>
+  <dgm:styleLbl name="node0">
+    <dgm:scene3d>
+      <a:camera prst="orthographicFront"/>
+      <a:lightRig rig="threePt" dir="t"/>
+    </dgm:scene3d>
+    <dgm:sp3d/>
+    <dgm:txPr/>
+    <dgm:style>
+      <a:lnRef idx="2">
+        <a:scrgbClr r="0" g="0" b="0"/>
+      </a:lnRef>
+      <a:fillRef idx="1">
+        <a:scrgbClr r="0" g="0" b="0"/>
+      </a:fillRef>
+      <a:effectRef idx="0">
+        <a:scrgbClr r="0" g="0" b="0"/>
+      </a:effectRef>
+      <a:fontRef idx="minor">
+        <a:schemeClr val="lt1"/>
+      </a:fontRef>
+    </dgm:style>
+  </dgm:styleLbl>
+  <dgm:styleLbl name="lnNode1">
+    <dgm:scene3d>
+      <a:camera prst="orthographicFront"/>
+      <a:lightRig rig="threePt" dir="t"/>
+    </dgm:scene3d>
+    <dgm:sp3d/>
+    <dgm:txPr/>
+    <dgm:style>
+      <a:lnRef idx="2">
+        <a:scrgbClr r="0" g="0" b="0"/>
+      </a:lnRef>
+      <a:fillRef idx="1">
+        <a:scrgbClr r="0" g="0" b="0"/>
+      </a:fillRef>
+      <a:effectRef idx="0">
+        <a:scrgbClr r="0" g="0" b="0"/>
+      </a:effectRef>
+      <a:fontRef idx="minor">
+        <a:schemeClr val="lt1"/>
+      </a:fontRef>
+    </dgm:style>
+  </dgm:styleLbl>
+  <dgm:styleLbl name="vennNode1">
+    <dgm:scene3d>
+      <a:camera prst="orthographicFront"/>
+      <a:lightRig rig="threePt" dir="t"/>
+    </dgm:scene3d>
+    <dgm:sp3d/>
+    <dgm:txPr/>
+    <dgm:style>
+      <a:lnRef idx="2">
+        <a:scrgbClr r="0" g="0" b="0"/>
+      </a:lnRef>
+      <a:fillRef idx="1">
+        <a:scrgbClr r="0" g="0" b="0"/>
+      </a:fillRef>
+      <a:effectRef idx="0">
+        <a:scrgbClr r="0" g="0" b="0"/>
+      </a:effectRef>
+      <a:fontRef idx="minor">
+        <a:schemeClr val="tx1"/>
+      </a:fontRef>
+    </dgm:style>
+  </dgm:styleLbl>
+  <dgm:styleLbl name="alignNode1">
+    <dgm:scene3d>
+      <a:camera prst="orthographicFront"/>
+      <a:lightRig rig="threePt" dir="t"/>
+    </dgm:scene3d>
+    <dgm:sp3d/>
+    <dgm:txPr/>
+    <dgm:style>
+      <a:lnRef idx="2">
+        <a:scrgbClr r="0" g="0" b="0"/>
+      </a:lnRef>
+      <a:fillRef idx="1">
+        <a:scrgbClr r="0" g="0" b="0"/>
+      </a:fillRef>
+      <a:effectRef idx="0">
+        <a:scrgbClr r="0" g="0" b="0"/>
+      </a:effectRef>
+      <a:fontRef idx="minor">
+        <a:schemeClr val="lt1"/>
+      </a:fontRef>
+    </dgm:style>
+  </dgm:styleLbl>
+  <dgm:styleLbl name="node1">
+    <dgm:scene3d>
+      <a:camera prst="orthographicFront"/>
+      <a:lightRig rig="threePt" dir="t"/>
+    </dgm:scene3d>
+    <dgm:sp3d/>
+    <dgm:txPr/>
+    <dgm:style>
+      <a:lnRef idx="2">
+        <a:scrgbClr r="0" g="0" b="0"/>
+      </a:lnRef>
+      <a:fillRef idx="1">
+        <a:scrgbClr r="0" g="0" b="0"/>
+      </a:fillRef>
+      <a:effectRef idx="0">
+        <a:scrgbClr r="0" g="0" b="0"/>
+      </a:effectRef>
+      <a:fontRef idx="minor">
+        <a:schemeClr val="lt1"/>
+      </a:fontRef>
+    </dgm:style>
+  </dgm:styleLbl>
+  <dgm:styleLbl name="node2">
+    <dgm:scene3d>
+      <a:camera prst="orthographicFront"/>
+      <a:lightRig rig="threePt" dir="t"/>
+    </dgm:scene3d>
+    <dgm:sp3d/>
+    <dgm:txPr/>
+    <dgm:style>
+      <a:lnRef idx="2">
+        <a:scrgbClr r="0" g="0" b="0"/>
+      </a:lnRef>
+      <a:fillRef idx="1">
+        <a:scrgbClr r="0" g="0" b="0"/>
+      </a:fillRef>
+      <a:effectRef idx="0">
+        <a:scrgbClr r="0" g="0" b="0"/>
+      </a:effectRef>
+      <a:fontRef idx="minor">
+        <a:schemeClr val="lt1"/>
+      </a:fontRef>
+    </dgm:style>
+  </dgm:styleLbl>
+  <dgm:styleLbl name="node3">
+    <dgm:scene3d>
+      <a:camera prst="orthographicFront"/>
+      <a:lightRig rig="threePt" dir="t"/>
+    </dgm:scene3d>
+    <dgm:sp3d/>
+    <dgm:txPr/>
+    <dgm:style>
+      <a:lnRef idx="2">
+        <a:scrgbClr r="0" g="0" b="0"/>
+      </a:lnRef>
+      <a:fillRef idx="1">
+        <a:scrgbClr r="0" g="0" b="0"/>
+      </a:fillRef>
+      <a:effectRef idx="0">
+        <a:scrgbClr r="0" g="0" b="0"/>
+      </a:effectRef>
+      <a:fontRef idx="minor">
+        <a:schemeClr val="lt1"/>
+      </a:fontRef>
+    </dgm:style>
+  </dgm:styleLbl>
+  <dgm:styleLbl name="node4">
+    <dgm:scene3d>
+      <a:camera prst="orthographicFront"/>
+      <a:lightRig rig="threePt" dir="t"/>
+    </dgm:scene3d>
+    <dgm:sp3d/>
+    <dgm:txPr/>
+    <dgm:style>
+      <a:lnRef idx="2">
+        <a:scrgbClr r="0" g="0" b="0"/>
+      </a:lnRef>
+      <a:fillRef idx="1">
+        <a:scrgbClr r="0" g="0" b="0"/>
+      </a:fillRef>
+      <a:effectRef idx="0">
+        <a:scrgbClr r="0" g="0" b="0"/>
+      </a:effectRef>
+      <a:fontRef idx="minor">
+        <a:schemeClr val="lt1"/>
+      </a:fontRef>
+    </dgm:style>
+  </dgm:styleLbl>
+  <dgm:styleLbl name="fgImgPlace1">
+    <dgm:scene3d>
+      <a:camera prst="orthographicFront"/>
+      <a:lightRig rig="threePt" dir="t"/>
+    </dgm:scene3d>
+    <dgm:sp3d/>
+    <dgm:txPr/>
+    <dgm:style>
+      <a:lnRef idx="2">
+        <a:scrgbClr r="0" g="0" b="0"/>
+      </a:lnRef>
+      <a:fillRef idx="1">
+        <a:scrgbClr r="0" g="0" b="0"/>
+      </a:fillRef>
+      <a:effectRef idx="0">
+        <a:scrgbClr r="0" g="0" b="0"/>
+      </a:effectRef>
+      <a:fontRef idx="minor"/>
+    </dgm:style>
+  </dgm:styleLbl>
+  <dgm:styleLbl name="alignImgPlace1">
+    <dgm:scene3d>
+      <a:camera prst="orthographicFront"/>
+      <a:lightRig rig="threePt" dir="t"/>
+    </dgm:scene3d>
+    <dgm:sp3d/>
+    <dgm:txPr/>
+    <dgm:style>
+      <a:lnRef idx="2">
+        <a:scrgbClr r="0" g="0" b="0"/>
+      </a:lnRef>
+      <a:fillRef idx="1">
+        <a:scrgbClr r="0" g="0" b="0"/>
+      </a:fillRef>
+      <a:effectRef idx="0">
+        <a:scrgbClr r="0" g="0" b="0"/>
+      </a:effectRef>
+      <a:fontRef idx="minor"/>
+    </dgm:style>
+  </dgm:styleLbl>
+  <dgm:styleLbl name="bgImgPlace1">
+    <dgm:scene3d>
+      <a:camera prst="orthographicFront"/>
+      <a:lightRig rig="threePt" dir="t"/>
+    </dgm:scene3d>
+    <dgm:sp3d/>
+    <dgm:txPr/>
+    <dgm:style>
+      <a:lnRef idx="2">
+        <a:scrgbClr r="0" g="0" b="0"/>
+      </a:lnRef>
+      <a:fillRef idx="1">
+        <a:scrgbClr r="0" g="0" b="0"/>
+      </a:fillRef>
+      <a:effectRef idx="0">
+        <a:scrgbClr r="0" g="0" b="0"/>
+      </a:effectRef>
+      <a:fontRef idx="minor"/>
+    </dgm:style>
+  </dgm:styleLbl>
+  <dgm:styleLbl name="sibTrans2D1">
+    <dgm:scene3d>
+      <a:camera prst="orthographicFront"/>
+      <a:lightRig rig="threePt" dir="t"/>
+    </dgm:scene3d>
+    <dgm:sp3d/>
+    <dgm:txPr/>
+    <dgm:style>
+      <a:lnRef idx="0">
+        <a:scrgbClr r="0" g="0" b="0"/>
+      </a:lnRef>
+      <a:fillRef idx="1">
+        <a:scrgbClr r="0" g="0" b="0"/>
+      </a:fillRef>
+      <a:effectRef idx="0">
+        <a:scrgbClr r="0" g="0" b="0"/>
+      </a:effectRef>
+      <a:fontRef idx="minor">
+        <a:schemeClr val="lt1"/>
+      </a:fontRef>
+    </dgm:style>
+  </dgm:styleLbl>
+  <dgm:styleLbl name="fgSibTrans2D1">
+    <dgm:scene3d>
+      <a:camera prst="orthographicFront"/>
+      <a:lightRig rig="threePt" dir="t"/>
+    </dgm:scene3d>
+    <dgm:sp3d/>
+    <dgm:txPr/>
+    <dgm:style>
+      <a:lnRef idx="0">
+        <a:scrgbClr r="0" g="0" b="0"/>
+      </a:lnRef>
+      <a:fillRef idx="1">
+        <a:scrgbClr r="0" g="0" b="0"/>
+      </a:fillRef>
+      <a:effectRef idx="0">
+        <a:scrgbClr r="0" g="0" b="0"/>
+      </a:effectRef>
+      <a:fontRef idx="minor">
+        <a:schemeClr val="lt1"/>
+      </a:fontRef>
+    </dgm:style>
+  </dgm:styleLbl>
+  <dgm:styleLbl name="bgSibTrans2D1">
+    <dgm:scene3d>
+      <a:camera prst="orthographicFront"/>
+      <a:lightRig rig="threePt" dir="t"/>
+    </dgm:scene3d>
+    <dgm:sp3d/>
+    <dgm:txPr/>
+    <dgm:style>
+      <a:lnRef idx="0">
+        <a:scrgbClr r="0" g="0" b="0"/>
+      </a:lnRef>
+      <a:fillRef idx="1">
+        <a:scrgbClr r="0" g="0" b="0"/>
+      </a:fillRef>
+      <a:effectRef idx="0">
+        <a:scrgbClr r="0" g="0" b="0"/>
+      </a:effectRef>
+      <a:fontRef idx="minor">
+        <a:schemeClr val="lt1"/>
+      </a:fontRef>
+    </dgm:style>
+  </dgm:styleLbl>
+  <dgm:styleLbl name="sibTrans1D1">
+    <dgm:scene3d>
+      <a:camera prst="orthographicFront"/>
+      <a:lightRig rig="threePt" dir="t"/>
+    </dgm:scene3d>
+    <dgm:sp3d/>
+    <dgm:txPr/>
+    <dgm:style>
+      <a:lnRef idx="1">
+        <a:scrgbClr r="0" g="0" b="0"/>
+      </a:lnRef>
+      <a:fillRef idx="0">
+        <a:scrgbClr r="0" g="0" b="0"/>
+      </a:fillRef>
+      <a:effectRef idx="0">
+        <a:scrgbClr r="0" g="0" b="0"/>
+      </a:effectRef>
+      <a:fontRef idx="minor"/>
+    </dgm:style>
+  </dgm:styleLbl>
+  <dgm:styleLbl name="callout">
+    <dgm:scene3d>
+      <a:camera prst="orthographicFront"/>
+      <a:lightRig rig="threePt" dir="t"/>
+    </dgm:scene3d>
+    <dgm:sp3d/>
+    <dgm:txPr/>
+    <dgm:style>
+      <a:lnRef idx="2">
+        <a:scrgbClr r="0" g="0" b="0"/>
+      </a:lnRef>
+      <a:fillRef idx="1">
+        <a:scrgbClr r="0" g="0" b="0"/>
+      </a:fillRef>
+      <a:effectRef idx="0">
+        <a:scrgbClr r="0" g="0" b="0"/>
+      </a:effectRef>
+      <a:fontRef idx="minor"/>
+    </dgm:style>
+  </dgm:styleLbl>
+  <dgm:styleLbl name="asst0">
+    <dgm:scene3d>
+      <a:camera prst="orthographicFront"/>
+      <a:lightRig rig="threePt" dir="t"/>
+    </dgm:scene3d>
+    <dgm:sp3d/>
+    <dgm:txPr/>
+    <dgm:style>
+      <a:lnRef idx="2">
+        <a:scrgbClr r="0" g="0" b="0"/>
+      </a:lnRef>
+      <a:fillRef idx="1">
+        <a:scrgbClr r="0" g="0" b="0"/>
+      </a:fillRef>
+      <a:effectRef idx="0">
+        <a:scrgbClr r="0" g="0" b="0"/>
+      </a:effectRef>
+      <a:fontRef idx="minor">
+        <a:schemeClr val="lt1"/>
+      </a:fontRef>
+    </dgm:style>
+  </dgm:styleLbl>
+  <dgm:styleLbl name="asst1">
+    <dgm:scene3d>
+      <a:camera prst="orthographicFront"/>
+      <a:lightRig rig="threePt" dir="t"/>
+    </dgm:scene3d>
+    <dgm:sp3d/>
+    <dgm:txPr/>
+    <dgm:style>
+      <a:lnRef idx="2">
+        <a:scrgbClr r="0" g="0" b="0"/>
+      </a:lnRef>
+      <a:fillRef idx="1">
+        <a:scrgbClr r="0" g="0" b="0"/>
+      </a:fillRef>
+      <a:effectRef idx="0">
+        <a:scrgbClr r="0" g="0" b="0"/>
+      </a:effectRef>
+      <a:fontRef idx="minor">
+        <a:schemeClr val="lt1"/>
+      </a:fontRef>
+    </dgm:style>
+  </dgm:styleLbl>
+  <dgm:styleLbl name="asst2">
+    <dgm:scene3d>
+      <a:camera prst="orthographicFront"/>
+      <a:lightRig rig="threePt" dir="t"/>
+    </dgm:scene3d>
+    <dgm:sp3d/>
+    <dgm:txPr/>
+    <dgm:style>
+      <a:lnRef idx="2">
+        <a:scrgbClr r="0" g="0" b="0"/>
+      </a:lnRef>
+      <a:fillRef idx="1">
+        <a:scrgbClr r="0" g="0" b="0"/>
+      </a:fillRef>
+      <a:effectRef idx="0">
+        <a:scrgbClr r="0" g="0" b="0"/>
+      </a:effectRef>
+      <a:fontRef idx="minor">
+        <a:schemeClr val="lt1"/>
+      </a:fontRef>
+    </dgm:style>
+  </dgm:styleLbl>
+  <dgm:styleLbl name="asst3">
+    <dgm:scene3d>
+      <a:camera prst="orthographicFront"/>
+      <a:lightRig rig="threePt" dir="t"/>
+    </dgm:scene3d>
+    <dgm:sp3d/>
+    <dgm:txPr/>
+    <dgm:style>
+      <a:lnRef idx="2">
+        <a:scrgbClr r="0" g="0" b="0"/>
+      </a:lnRef>
+      <a:fillRef idx="1">
+        <a:scrgbClr r="0" g="0" b="0"/>
+      </a:fillRef>
+      <a:effectRef idx="0">
+        <a:scrgbClr r="0" g="0" b="0"/>
+      </a:effectRef>
+      <a:fontRef idx="minor">
+        <a:schemeClr val="lt1"/>
+      </a:fontRef>
+    </dgm:style>
+  </dgm:styleLbl>
+  <dgm:styleLbl name="asst4">
+    <dgm:scene3d>
+      <a:camera prst="orthographicFront"/>
+      <a:lightRig rig="threePt" dir="t"/>
+    </dgm:scene3d>
+    <dgm:sp3d/>
+    <dgm:txPr/>
+    <dgm:style>
+      <a:lnRef idx="2">
+        <a:scrgbClr r="0" g="0" b="0"/>
+      </a:lnRef>
+      <a:fillRef idx="1">
+        <a:scrgbClr r="0" g="0" b="0"/>
+      </a:fillRef>
+      <a:effectRef idx="0">
+        <a:scrgbClr r="0" g="0" b="0"/>
+      </a:effectRef>
+      <a:fontRef idx="minor">
+        <a:schemeClr val="lt1"/>
+      </a:fontRef>
+    </dgm:style>
+  </dgm:styleLbl>
+  <dgm:styleLbl name="parChTrans2D1">
+    <dgm:scene3d>
+      <a:camera prst="orthographicFront"/>
+      <a:lightRig rig="threePt" dir="t"/>
+    </dgm:scene3d>
+    <dgm:sp3d/>
+    <dgm:txPr/>
+    <dgm:style>
+      <a:lnRef idx="2">
+        <a:scrgbClr r="0" g="0" b="0"/>
+      </a:lnRef>
+      <a:fillRef idx="1">
+        <a:scrgbClr r="0" g="0" b="0"/>
+      </a:fillRef>
+      <a:effectRef idx="0">
+        <a:scrgbClr r="0" g="0" b="0"/>
+      </a:effectRef>
+      <a:fontRef idx="minor">
+        <a:schemeClr val="lt1"/>
+      </a:fontRef>
+    </dgm:style>
+  </dgm:styleLbl>
+  <dgm:styleLbl name="parChTrans2D2">
+    <dgm:scene3d>
+      <a:camera prst="orthographicFront"/>
+      <a:lightRig rig="threePt" dir="t"/>
+    </dgm:scene3d>
+    <dgm:sp3d/>
+    <dgm:txPr/>
+    <dgm:style>
+      <a:lnRef idx="2">
+        <a:scrgbClr r="0" g="0" b="0"/>
+      </a:lnRef>
+      <a:fillRef idx="1">
+        <a:scrgbClr r="0" g="0" b="0"/>
+      </a:fillRef>
+      <a:effectRef idx="0">
+        <a:scrgbClr r="0" g="0" b="0"/>
+      </a:effectRef>
+      <a:fontRef idx="minor">
+        <a:schemeClr val="lt1"/>
+      </a:fontRef>
+    </dgm:style>
+  </dgm:styleLbl>
+  <dgm:styleLbl name="parChTrans2D3">
+    <dgm:scene3d>
+      <a:camera prst="orthographicFront"/>
+      <a:lightRig rig="threePt" dir="t"/>
+    </dgm:scene3d>
+    <dgm:sp3d/>
+    <dgm:txPr/>
+    <dgm:style>
+      <a:lnRef idx="2">
+        <a:scrgbClr r="0" g="0" b="0"/>
+      </a:lnRef>
+      <a:fillRef idx="1">
+        <a:scrgbClr r="0" g="0" b="0"/>
+      </a:fillRef>
+      <a:effectRef idx="0">
+        <a:scrgbClr r="0" g="0" b="0"/>
+      </a:effectRef>
+      <a:fontRef idx="minor">
+        <a:schemeClr val="lt1"/>
+      </a:fontRef>
+    </dgm:style>
+  </dgm:styleLbl>
+  <dgm:styleLbl name="parChTrans2D4">
+    <dgm:scene3d>
+      <a:camera prst="orthographicFront"/>
+      <a:lightRig rig="threePt" dir="t"/>
+    </dgm:scene3d>
+    <dgm:sp3d/>
+    <dgm:txPr/>
+    <dgm:style>
+      <a:lnRef idx="2">
+        <a:scrgbClr r="0" g="0" b="0"/>
+      </a:lnRef>
+      <a:fillRef idx="1">
+        <a:scrgbClr r="0" g="0" b="0"/>
+      </a:fillRef>
+      <a:effectRef idx="0">
+        <a:scrgbClr r="0" g="0" b="0"/>
+      </a:effectRef>
+      <a:fontRef idx="minor">
+        <a:schemeClr val="lt1"/>
+      </a:fontRef>
+    </dgm:style>
+  </dgm:styleLbl>
+  <dgm:styleLbl name="parChTrans1D1">
+    <dgm:scene3d>
+      <a:camera prst="orthographicFront"/>
+      <a:lightRig rig="threePt" dir="t"/>
+    </dgm:scene3d>
+    <dgm:sp3d/>
+    <dgm:txPr/>
+    <dgm:style>
+      <a:lnRef idx="2">
+        <a:scrgbClr r="0" g="0" b="0"/>
+      </a:lnRef>
+      <a:fillRef idx="0">
+        <a:scrgbClr r="0" g="0" b="0"/>
+      </a:fillRef>
+      <a:effectRef idx="0">
+        <a:scrgbClr r="0" g="0" b="0"/>
+      </a:effectRef>
+      <a:fontRef idx="minor"/>
+    </dgm:style>
+  </dgm:styleLbl>
+  <dgm:styleLbl name="parChTrans1D2">
+    <dgm:scene3d>
+      <a:camera prst="orthographicFront"/>
+      <a:lightRig rig="threePt" dir="t"/>
+    </dgm:scene3d>
+    <dgm:sp3d/>
+    <dgm:txPr/>
+    <dgm:style>
+      <a:lnRef idx="2">
+        <a:scrgbClr r="0" g="0" b="0"/>
+      </a:lnRef>
+      <a:fillRef idx="0">
+        <a:scrgbClr r="0" g="0" b="0"/>
+      </a:fillRef>
+      <a:effectRef idx="0">
+        <a:scrgbClr r="0" g="0" b="0"/>
+      </a:effectRef>
+      <a:fontRef idx="minor"/>
+    </dgm:style>
+  </dgm:styleLbl>
+  <dgm:styleLbl name="parChTrans1D3">
+    <dgm:scene3d>
+      <a:camera prst="orthographicFront"/>
+      <a:lightRig rig="threePt" dir="t"/>
+    </dgm:scene3d>
+    <dgm:sp3d/>
+    <dgm:txPr/>
+    <dgm:style>
+      <a:lnRef idx="2">
+        <a:scrgbClr r="0" g="0" b="0"/>
+      </a:lnRef>
+      <a:fillRef idx="0">
+        <a:scrgbClr r="0" g="0" b="0"/>
+      </a:fillRef>
+      <a:effectRef idx="0">
+        <a:scrgbClr r="0" g="0" b="0"/>
+      </a:effectRef>
+      <a:fontRef idx="minor"/>
+    </dgm:style>
+  </dgm:styleLbl>
+  <dgm:styleLbl name="parChTrans1D4">
+    <dgm:scene3d>
+      <a:camera prst="orthographicFront"/>
+      <a:lightRig rig="threePt" dir="t"/>
+    </dgm:scene3d>
+    <dgm:sp3d/>
+    <dgm:txPr/>
+    <dgm:style>
+      <a:lnRef idx="2">
+        <a:scrgbClr r="0" g="0" b="0"/>
+      </a:lnRef>
+      <a:fillRef idx="0">
+        <a:scrgbClr r="0" g="0" b="0"/>
+      </a:fillRef>
+      <a:effectRef idx="0">
+        <a:scrgbClr r="0" g="0" b="0"/>
+      </a:effectRef>
+      <a:fontRef idx="minor"/>
+    </dgm:style>
+  </dgm:styleLbl>
+  <dgm:styleLbl name="fgAcc1">
+    <dgm:scene3d>
+      <a:camera prst="orthographicFront"/>
+      <a:lightRig rig="threePt" dir="t"/>
+    </dgm:scene3d>
+    <dgm:sp3d/>
+    <dgm:txPr/>
+    <dgm:style>
+      <a:lnRef idx="2">
+        <a:scrgbClr r="0" g="0" b="0"/>
+      </a:lnRef>
+      <a:fillRef idx="1">
+        <a:scrgbClr r="0" g="0" b="0"/>
+      </a:fillRef>
+      <a:effectRef idx="0">
+        <a:scrgbClr r="0" g="0" b="0"/>
+      </a:effectRef>
+      <a:fontRef idx="minor"/>
+    </dgm:style>
+  </dgm:styleLbl>
+  <dgm:styleLbl name="conFgAcc1">
+    <dgm:scene3d>
+      <a:camera prst="orthographicFront"/>
+      <a:lightRig rig="threePt" dir="t"/>
+    </dgm:scene3d>
+    <dgm:sp3d/>
+    <dgm:txPr/>
+    <dgm:style>
+      <a:lnRef idx="2">
+        <a:scrgbClr r="0" g="0" b="0"/>
+      </a:lnRef>
+      <a:fillRef idx="1">
+        <a:scrgbClr r="0" g="0" b="0"/>
+      </a:fillRef>
+      <a:effectRef idx="0">
+        <a:scrgbClr r="0" g="0" b="0"/>
+      </a:effectRef>
+      <a:fontRef idx="minor"/>
+    </dgm:style>
+  </dgm:styleLbl>
+  <dgm:styleLbl name="alignAcc1">
+    <dgm:scene3d>
+      <a:camera prst="orthographicFront"/>
+      <a:lightRig rig="threePt" dir="t"/>
+    </dgm:scene3d>
+    <dgm:sp3d/>
+    <dgm:txPr/>
+    <dgm:style>
+      <a:lnRef idx="2">
+        <a:scrgbClr r="0" g="0" b="0"/>
+      </a:lnRef>
+      <a:fillRef idx="1">
+        <a:scrgbClr r="0" g="0" b="0"/>
+      </a:fillRef>
+      <a:effectRef idx="0">
+        <a:scrgbClr r="0" g="0" b="0"/>
+      </a:effectRef>
+      <a:fontRef idx="minor"/>
+    </dgm:style>
+  </dgm:styleLbl>
+  <dgm:styleLbl name="trAlignAcc1">
+    <dgm:scene3d>
+      <a:camera prst="orthographicFront"/>
+      <a:lightRig rig="threePt" dir="t"/>
+    </dgm:scene3d>
+    <dgm:sp3d/>
+    <dgm:txPr/>
+    <dgm:style>
+      <a:lnRef idx="1">
+        <a:scrgbClr r="0" g="0" b="0"/>
+      </a:lnRef>
+      <a:fillRef idx="1">
+        <a:scrgbClr r="0" g="0" b="0"/>
+      </a:fillRef>
+      <a:effectRef idx="0">
+        <a:scrgbClr r="0" g="0" b="0"/>
+      </a:effectRef>
+      <a:fontRef idx="minor"/>
+    </dgm:style>
+  </dgm:styleLbl>
+  <dgm:styleLbl name="bgAcc1">
+    <dgm:scene3d>
+      <a:camera prst="orthographicFront"/>
+      <a:lightRig rig="threePt" dir="t"/>
+    </dgm:scene3d>
+    <dgm:sp3d/>
+    <dgm:txPr/>
+    <dgm:style>
+      <a:lnRef idx="2">
+        <a:scrgbClr r="0" g="0" b="0"/>
+      </a:lnRef>
+      <a:fillRef idx="1">
+        <a:scrgbClr r="0" g="0" b="0"/>
+      </a:fillRef>
+      <a:effectRef idx="0">
+        <a:scrgbClr r="0" g="0" b="0"/>
+      </a:effectRef>
+      <a:fontRef idx="minor"/>
+    </dgm:style>
+  </dgm:styleLbl>
+  <dgm:styleLbl name="solidFgAcc1">
+    <dgm:scene3d>
+      <a:camera prst="orthographicFront"/>
+      <a:lightRig rig="threePt" dir="t"/>
+    </dgm:scene3d>
+    <dgm:sp3d/>
+    <dgm:txPr/>
+    <dgm:style>
+      <a:lnRef idx="2">
+        <a:scrgbClr r="0" g="0" b="0"/>
+      </a:lnRef>
+      <a:fillRef idx="1">
+        <a:scrgbClr r="0" g="0" b="0"/>
+      </a:fillRef>
+      <a:effectRef idx="0">
+        <a:scrgbClr r="0" g="0" b="0"/>
+      </a:effectRef>
+      <a:fontRef idx="minor"/>
+    </dgm:style>
+  </dgm:styleLbl>
+  <dgm:styleLbl name="solidAlignAcc1">
+    <dgm:scene3d>
+      <a:camera prst="orthographicFront"/>
+      <a:lightRig rig="threePt" dir="t"/>
+    </dgm:scene3d>
+    <dgm:sp3d/>
+    <dgm:txPr/>
+    <dgm:style>
+      <a:lnRef idx="2">
+        <a:scrgbClr r="0" g="0" b="0"/>
+      </a:lnRef>
+      <a:fillRef idx="1">
+        <a:scrgbClr r="0" g="0" b="0"/>
+      </a:fillRef>
+      <a:effectRef idx="0">
+        <a:scrgbClr r="0" g="0" b="0"/>
+      </a:effectRef>
+      <a:fontRef idx="minor"/>
+    </dgm:style>
+  </dgm:styleLbl>
+  <dgm:styleLbl name="solidBgAcc1">
+    <dgm:scene3d>
+      <a:camera prst="orthographicFront"/>
+      <a:lightRig rig="threePt" dir="t"/>
+    </dgm:scene3d>
+    <dgm:sp3d/>
+    <dgm:txPr/>
+    <dgm:style>
+      <a:lnRef idx="2">
+        <a:scrgbClr r="0" g="0" b="0"/>
+      </a:lnRef>
+      <a:fillRef idx="1">
+        <a:scrgbClr r="0" g="0" b="0"/>
+      </a:fillRef>
+      <a:effectRef idx="0">
+        <a:scrgbClr r="0" g="0" b="0"/>
+      </a:effectRef>
+      <a:fontRef idx="minor"/>
+    </dgm:style>
+  </dgm:styleLbl>
+  <dgm:styleLbl name="fgAccFollowNode1">
+    <dgm:scene3d>
+      <a:camera prst="orthographicFront"/>
+      <a:lightRig rig="threePt" dir="t"/>
+    </dgm:scene3d>
+    <dgm:sp3d/>
+    <dgm:txPr/>
+    <dgm:style>
+      <a:lnRef idx="2">
+        <a:scrgbClr r="0" g="0" b="0"/>
+      </a:lnRef>
+      <a:fillRef idx="1">
+        <a:scrgbClr r="0" g="0" b="0"/>
+      </a:fillRef>
+      <a:effectRef idx="0">
+        <a:scrgbClr r="0" g="0" b="0"/>
+      </a:effectRef>
+      <a:fontRef idx="minor"/>
+    </dgm:style>
+  </dgm:styleLbl>
+  <dgm:styleLbl name="alignAccFollowNode1">
+    <dgm:scene3d>
+      <a:camera prst="orthographicFront"/>
+      <a:lightRig rig="threePt" dir="t"/>
+    </dgm:scene3d>
+    <dgm:sp3d/>
+    <dgm:txPr/>
+    <dgm:style>
+      <a:lnRef idx="2">
+        <a:scrgbClr r="0" g="0" b="0"/>
+      </a:lnRef>
+      <a:fillRef idx="1">
+        <a:scrgbClr r="0" g="0" b="0"/>
+      </a:fillRef>
+      <a:effectRef idx="0">
+        <a:scrgbClr r="0" g="0" b="0"/>
+      </a:effectRef>
+      <a:fontRef idx="minor"/>
+    </dgm:style>
+  </dgm:styleLbl>
+  <dgm:styleLbl name="bgAccFollowNode1">
+    <dgm:scene3d>
+      <a:camera prst="orthographicFront"/>
+      <a:lightRig rig="threePt" dir="t"/>
+    </dgm:scene3d>
+    <dgm:sp3d/>
+    <dgm:txPr/>
+    <dgm:style>
+      <a:lnRef idx="2">
+        <a:scrgbClr r="0" g="0" b="0"/>
+      </a:lnRef>
+      <a:fillRef idx="1">
+        <a:scrgbClr r="0" g="0" b="0"/>
+      </a:fillRef>
+      <a:effectRef idx="0">
+        <a:scrgbClr r="0" g="0" b="0"/>
+      </a:effectRef>
+      <a:fontRef idx="minor"/>
+    </dgm:style>
+  </dgm:styleLbl>
+  <dgm:styleLbl name="fgAcc0">
+    <dgm:scene3d>
+      <a:camera prst="orthographicFront"/>
+      <a:lightRig rig="threePt" dir="t"/>
+    </dgm:scene3d>
+    <dgm:sp3d/>
+    <dgm:txPr/>
+    <dgm:style>
+      <a:lnRef idx="2">
+        <a:scrgbClr r="0" g="0" b="0"/>
+      </a:lnRef>
+      <a:fillRef idx="1">
+        <a:scrgbClr r="0" g="0" b="0"/>
+      </a:fillRef>
+      <a:effectRef idx="0">
+        <a:scrgbClr r="0" g="0" b="0"/>
+      </a:effectRef>
+      <a:fontRef idx="minor"/>
+    </dgm:style>
+  </dgm:styleLbl>
+  <dgm:styleLbl name="fgAcc2">
+    <dgm:scene3d>
+      <a:camera prst="orthographicFront"/>
+      <a:lightRig rig="threePt" dir="t"/>
+    </dgm:scene3d>
+    <dgm:sp3d/>
+    <dgm:txPr/>
+    <dgm:style>
+      <a:lnRef idx="2">
+        <a:scrgbClr r="0" g="0" b="0"/>
+      </a:lnRef>
+      <a:fillRef idx="1">
+        <a:scrgbClr r="0" g="0" b="0"/>
+      </a:fillRef>
+      <a:effectRef idx="0">
+        <a:scrgbClr r="0" g="0" b="0"/>
+      </a:effectRef>
+      <a:fontRef idx="minor"/>
+    </dgm:style>
+  </dgm:styleLbl>
+  <dgm:styleLbl name="fgAcc3">
+    <dgm:scene3d>
+      <a:camera prst="orthographicFront"/>
+      <a:lightRig rig="threePt" dir="t"/>
+    </dgm:scene3d>
+    <dgm:sp3d/>
+    <dgm:txPr/>
+    <dgm:style>
+      <a:lnRef idx="2">
+        <a:scrgbClr r="0" g="0" b="0"/>
+      </a:lnRef>
+      <a:fillRef idx="1">
+        <a:scrgbClr r="0" g="0" b="0"/>
+      </a:fillRef>
+      <a:effectRef idx="0">
+        <a:scrgbClr r="0" g="0" b="0"/>
+      </a:effectRef>
+      <a:fontRef idx="minor"/>
+    </dgm:style>
+  </dgm:styleLbl>
+  <dgm:styleLbl name="fgAcc4">
+    <dgm:scene3d>
+      <a:camera prst="orthographicFront"/>
+      <a:lightRig rig="threePt" dir="t"/>
+    </dgm:scene3d>
+    <dgm:sp3d/>
+    <dgm:txPr/>
+    <dgm:style>
+      <a:lnRef idx="2">
+        <a:scrgbClr r="0" g="0" b="0"/>
+      </a:lnRef>
+      <a:fillRef idx="1">
+        <a:scrgbClr r="0" g="0" b="0"/>
+      </a:fillRef>
+      <a:effectRef idx="0">
+        <a:scrgbClr r="0" g="0" b="0"/>
+      </a:effectRef>
+      <a:fontRef idx="minor"/>
+    </dgm:style>
+  </dgm:styleLbl>
+  <dgm:styleLbl name="bgShp">
+    <dgm:scene3d>
+      <a:camera prst="orthographicFront"/>
+      <a:lightRig rig="threePt" dir="t"/>
+    </dgm:scene3d>
+    <dgm:sp3d/>
+    <dgm:txPr/>
+    <dgm:style>
+      <a:lnRef idx="0">
+        <a:scrgbClr r="0" g="0" b="0"/>
+      </a:lnRef>
+      <a:fillRef idx="1">
+        <a:scrgbClr r="0" g="0" b="0"/>
+      </a:fillRef>
+      <a:effectRef idx="0">
+        <a:scrgbClr r="0" g="0" b="0"/>
+      </a:effectRef>
+      <a:fontRef idx="minor"/>
+    </dgm:style>
+  </dgm:styleLbl>
+  <dgm:styleLbl name="dkBgShp">
+    <dgm:scene3d>
+      <a:camera prst="orthographicFront"/>
+      <a:lightRig rig="threePt" dir="t"/>
+    </dgm:scene3d>
+    <dgm:sp3d/>
+    <dgm:txPr/>
+    <dgm:style>
+      <a:lnRef idx="0">
+        <a:scrgbClr r="0" g="0" b="0"/>
+      </a:lnRef>
+      <a:fillRef idx="1">
+        <a:scrgbClr r="0" g="0" b="0"/>
+      </a:fillRef>
+      <a:effectRef idx="0">
+        <a:scrgbClr r="0" g="0" b="0"/>
+      </a:effectRef>
+      <a:fontRef idx="minor"/>
+    </dgm:style>
+  </dgm:styleLbl>
+  <dgm:styleLbl name="trBgShp">
+    <dgm:scene3d>
+      <a:camera prst="orthographicFront"/>
+      <a:lightRig rig="threePt" dir="t"/>
+    </dgm:scene3d>
+    <dgm:sp3d/>
+    <dgm:txPr/>
+    <dgm:style>
+      <a:lnRef idx="0">
+        <a:scrgbClr r="0" g="0" b="0"/>
+      </a:lnRef>
+      <a:fillRef idx="1">
+        <a:scrgbClr r="0" g="0" b="0"/>
+      </a:fillRef>
+      <a:effectRef idx="0">
+        <a:scrgbClr r="0" g="0" b="0"/>
+      </a:effectRef>
+      <a:fontRef idx="minor"/>
+    </dgm:style>
+  </dgm:styleLbl>
+  <dgm:styleLbl name="fgShp">
+    <dgm:scene3d>
+      <a:camera prst="orthographicFront"/>
+      <a:lightRig rig="threePt" dir="t"/>
+    </dgm:scene3d>
+    <dgm:sp3d/>
+    <dgm:txPr/>
+    <dgm:style>
+      <a:lnRef idx="2">
+        <a:scrgbClr r="0" g="0" b="0"/>
+      </a:lnRef>
+      <a:fillRef idx="1">
+        <a:scrgbClr r="0" g="0" b="0"/>
+      </a:fillRef>
+      <a:effectRef idx="0">
+        <a:scrgbClr r="0" g="0" b="0"/>
+      </a:effectRef>
+      <a:fontRef idx="minor"/>
+    </dgm:style>
+  </dgm:styleLbl>
+  <dgm:styleLbl name="revTx">
+    <dgm:scene3d>
+      <a:camera prst="orthographicFront"/>
+      <a:lightRig rig="threePt" dir="t"/>
+    </dgm:scene3d>
+    <dgm:sp3d/>
+    <dgm:txPr/>
+    <dgm:style>
+      <a:lnRef idx="0">
+        <a:scrgbClr r="0" g="0" b="0"/>
+      </a:lnRef>
+      <a:fillRef idx="0">
+        <a:scrgbClr r="0" g="0" b="0"/>
+      </a:fillRef>
+      <a:effectRef idx="0">
+        <a:scrgbClr r="0" g="0" b="0"/>
+      </a:effectRef>
+      <a:fontRef idx="minor"/>
+    </dgm:style>
+  </dgm:styleLbl>
+</dgm:styleDef>
+</file>
+
 <file path=ppt/slideLayouts/slideLayout1.xml><?xml version="1.0" encoding="utf-8"?>
 <p:sldLayout xmlns:a="http://schemas.openxmlformats.org/drawingml/2006/main" xmlns:r="http://schemas.openxmlformats.org/officeDocument/2006/relationships" xmlns:p="http://schemas.openxmlformats.org/presentationml/2006/main" type="title" preserve="1">
   <p:cSld name="Title Slide">
@@ -6647,7 +9487,7 @@
           <a:effectLst/>
           <a:extLst>
             <a:ext uri="{91240B29-F687-4f45-9708-019B960494DF}">
-              <a14:hiddenLine xmlns:a14="http://schemas.microsoft.com/office/drawing/2010/main" xmlns="" w="9525">
+              <a14:hiddenLine xmlns="" xmlns:a14="http://schemas.microsoft.com/office/drawing/2010/main" w="9525">
                 <a:solidFill>
                   <a:srgbClr val="000000"/>
                 </a:solidFill>
@@ -6840,7 +9680,7 @@
             <a:fld id="{9334D819-9F07-4261-B09B-9E467E5D9002}" type="datetimeFigureOut">
               <a:rPr lang="en-US" smtClean="0"/>
               <a:pPr/>
-              <a:t>5/3/2017</a:t>
+              <a:t>5/17/2017</a:t>
             </a:fld>
             <a:endParaRPr lang="en-US" dirty="0"/>
           </a:p>
@@ -7160,7 +10000,7 @@
             <a:fld id="{9334D819-9F07-4261-B09B-9E467E5D9002}" type="datetimeFigureOut">
               <a:rPr lang="en-US" smtClean="0"/>
               <a:pPr/>
-              <a:t>5/3/2017</a:t>
+              <a:t>5/17/2017</a:t>
             </a:fld>
             <a:endParaRPr lang="en-US" dirty="0"/>
           </a:p>
@@ -7650,7 +10490,7 @@
             <a:fld id="{9334D819-9F07-4261-B09B-9E467E5D9002}" type="datetimeFigureOut">
               <a:rPr lang="en-US" smtClean="0"/>
               <a:pPr/>
-              <a:t>5/3/2017</a:t>
+              <a:t>5/17/2017</a:t>
             </a:fld>
             <a:endParaRPr lang="en-US" dirty="0"/>
           </a:p>
@@ -8021,7 +10861,7 @@
             <a:fld id="{9334D819-9F07-4261-B09B-9E467E5D9002}" type="datetimeFigureOut">
               <a:rPr lang="en-US" smtClean="0"/>
               <a:pPr/>
-              <a:t>5/3/2017</a:t>
+              <a:t>5/17/2017</a:t>
             </a:fld>
             <a:endParaRPr lang="en-US" dirty="0"/>
           </a:p>
@@ -8177,7 +11017,7 @@
           <a:ln/>
           <a:extLst>
             <a:ext uri="{91240B29-F687-4f45-9708-019B960494DF}">
-              <a14:hiddenLine xmlns:a14="http://schemas.microsoft.com/office/drawing/2010/main" xmlns="" w="9525">
+              <a14:hiddenLine xmlns="" xmlns:a14="http://schemas.microsoft.com/office/drawing/2010/main" w="9525">
                 <a:solidFill>
                   <a:srgbClr val="000000"/>
                 </a:solidFill>
@@ -8295,7 +11135,7 @@
           <a:p>
             <a:fld id="{9334D819-9F07-4261-B09B-9E467E5D9002}" type="datetimeFigureOut">
               <a:rPr lang="en-US" smtClean="0"/>
-              <a:t>5/3/2017</a:t>
+              <a:t>5/17/2017</a:t>
             </a:fld>
             <a:endParaRPr lang="en-US" dirty="0"/>
           </a:p>
@@ -8452,7 +11292,7 @@
           <a:ln/>
           <a:extLst>
             <a:ext uri="{91240B29-F687-4f45-9708-019B960494DF}">
-              <a14:hiddenLine xmlns:a14="http://schemas.microsoft.com/office/drawing/2010/main" xmlns="" w="9525">
+              <a14:hiddenLine xmlns="" xmlns:a14="http://schemas.microsoft.com/office/drawing/2010/main" w="9525">
                 <a:solidFill>
                   <a:srgbClr val="000000"/>
                 </a:solidFill>
@@ -8580,7 +11420,7 @@
           <a:p>
             <a:fld id="{9334D819-9F07-4261-B09B-9E467E5D9002}" type="datetimeFigureOut">
               <a:rPr lang="en-US" smtClean="0"/>
-              <a:t>5/3/2017</a:t>
+              <a:t>5/17/2017</a:t>
             </a:fld>
             <a:endParaRPr lang="en-US" dirty="0"/>
           </a:p>
@@ -8735,7 +11575,7 @@
           <a:ln/>
           <a:extLst>
             <a:ext uri="{91240B29-F687-4f45-9708-019B960494DF}">
-              <a14:hiddenLine xmlns:a14="http://schemas.microsoft.com/office/drawing/2010/main" xmlns="" w="9525">
+              <a14:hiddenLine xmlns="" xmlns:a14="http://schemas.microsoft.com/office/drawing/2010/main" w="9525">
                 <a:solidFill>
                   <a:srgbClr val="000000"/>
                 </a:solidFill>
@@ -8863,7 +11703,7 @@
           <a:p>
             <a:fld id="{9334D819-9F07-4261-B09B-9E467E5D9002}" type="datetimeFigureOut">
               <a:rPr lang="en-US" smtClean="0"/>
-              <a:t>5/3/2017</a:t>
+              <a:t>5/17/2017</a:t>
             </a:fld>
             <a:endParaRPr lang="en-US" dirty="0"/>
           </a:p>
@@ -9207,7 +12047,7 @@
             <a:fld id="{9334D819-9F07-4261-B09B-9E467E5D9002}" type="datetimeFigureOut">
               <a:rPr lang="en-US" smtClean="0"/>
               <a:pPr/>
-              <a:t>5/3/2017</a:t>
+              <a:t>5/17/2017</a:t>
             </a:fld>
             <a:endParaRPr lang="en-US" dirty="0"/>
           </a:p>
@@ -9363,7 +12203,7 @@
           <a:ln/>
           <a:extLst>
             <a:ext uri="{91240B29-F687-4f45-9708-019B960494DF}">
-              <a14:hiddenLine xmlns:a14="http://schemas.microsoft.com/office/drawing/2010/main" xmlns="" w="9525">
+              <a14:hiddenLine xmlns="" xmlns:a14="http://schemas.microsoft.com/office/drawing/2010/main" w="9525">
                 <a:solidFill>
                   <a:srgbClr val="000000"/>
                 </a:solidFill>
@@ -9547,7 +12387,7 @@
           <a:p>
             <a:fld id="{9334D819-9F07-4261-B09B-9E467E5D9002}" type="datetimeFigureOut">
               <a:rPr lang="en-US" smtClean="0"/>
-              <a:t>5/3/2017</a:t>
+              <a:t>5/17/2017</a:t>
             </a:fld>
             <a:endParaRPr lang="en-US" dirty="0"/>
           </a:p>
@@ -9707,7 +12547,7 @@
           <a:ln/>
           <a:extLst>
             <a:ext uri="{91240B29-F687-4f45-9708-019B960494DF}">
-              <a14:hiddenLine xmlns:a14="http://schemas.microsoft.com/office/drawing/2010/main" xmlns="" w="9525">
+              <a14:hiddenLine xmlns="" xmlns:a14="http://schemas.microsoft.com/office/drawing/2010/main" w="9525">
                 <a:solidFill>
                   <a:srgbClr val="000000"/>
                 </a:solidFill>
@@ -10029,7 +12869,7 @@
           <a:p>
             <a:fld id="{9334D819-9F07-4261-B09B-9E467E5D9002}" type="datetimeFigureOut">
               <a:rPr lang="en-US" smtClean="0"/>
-              <a:t>5/3/2017</a:t>
+              <a:t>5/17/2017</a:t>
             </a:fld>
             <a:endParaRPr lang="en-US" dirty="0"/>
           </a:p>
@@ -10189,7 +13029,7 @@
           <a:ln/>
           <a:extLst>
             <a:ext uri="{91240B29-F687-4f45-9708-019B960494DF}">
-              <a14:hiddenLine xmlns:a14="http://schemas.microsoft.com/office/drawing/2010/main" xmlns="" w="9525">
+              <a14:hiddenLine xmlns="" xmlns:a14="http://schemas.microsoft.com/office/drawing/2010/main" w="9525">
                 <a:solidFill>
                   <a:srgbClr val="000000"/>
                 </a:solidFill>
@@ -10255,7 +13095,7 @@
           <a:p>
             <a:fld id="{9334D819-9F07-4261-B09B-9E467E5D9002}" type="datetimeFigureOut">
               <a:rPr lang="en-US" smtClean="0"/>
-              <a:t>5/3/2017</a:t>
+              <a:t>5/17/2017</a:t>
             </a:fld>
             <a:endParaRPr lang="en-US" dirty="0"/>
           </a:p>
@@ -10350,7 +13190,7 @@
           <a:p>
             <a:fld id="{9334D819-9F07-4261-B09B-9E467E5D9002}" type="datetimeFigureOut">
               <a:rPr lang="en-US" smtClean="0"/>
-              <a:t>5/3/2017</a:t>
+              <a:t>5/17/2017</a:t>
             </a:fld>
             <a:endParaRPr lang="en-US" dirty="0"/>
           </a:p>
@@ -10618,7 +13458,7 @@
           <a:ln/>
           <a:extLst>
             <a:ext uri="{91240B29-F687-4f45-9708-019B960494DF}">
-              <a14:hiddenLine xmlns:a14="http://schemas.microsoft.com/office/drawing/2010/main" xmlns="" w="9525">
+              <a14:hiddenLine xmlns="" xmlns:a14="http://schemas.microsoft.com/office/drawing/2010/main" w="9525">
                 <a:solidFill>
                   <a:srgbClr val="000000"/>
                 </a:solidFill>
@@ -10817,7 +13657,7 @@
           <a:p>
             <a:fld id="{9334D819-9F07-4261-B09B-9E467E5D9002}" type="datetimeFigureOut">
               <a:rPr lang="en-US" smtClean="0"/>
-              <a:t>5/3/2017</a:t>
+              <a:t>5/17/2017</a:t>
             </a:fld>
             <a:endParaRPr lang="en-US" dirty="0"/>
           </a:p>
@@ -11135,7 +13975,7 @@
           <a:p>
             <a:fld id="{9334D819-9F07-4261-B09B-9E467E5D9002}" type="datetimeFigureOut">
               <a:rPr lang="en-US" smtClean="0"/>
-              <a:t>5/3/2017</a:t>
+              <a:t>5/17/2017</a:t>
             </a:fld>
             <a:endParaRPr lang="en-US" dirty="0"/>
           </a:p>
@@ -11406,7 +14246,7 @@
             <a:fld id="{9334D819-9F07-4261-B09B-9E467E5D9002}" type="datetimeFigureOut">
               <a:rPr lang="en-US" smtClean="0"/>
               <a:pPr/>
-              <a:t>5/3/2017</a:t>
+              <a:t>5/17/2017</a:t>
             </a:fld>
             <a:endParaRPr lang="en-US" dirty="0"/>
           </a:p>
@@ -11983,7 +14823,7 @@
           <a:p>
             <a:r>
               <a:rPr lang="en-US" dirty="0"/>
-              <a:t>Introduction	</a:t>
+              <a:t>What is Multi-agent pathfinding?</a:t>
             </a:r>
           </a:p>
         </p:txBody>
@@ -12005,19 +14845,19 @@
           <a:p>
             <a:r>
               <a:rPr lang="en-US" dirty="0"/>
-              <a:t>MAPF is…</a:t>
+              <a:t>Cooperative MAPF?</a:t>
             </a:r>
           </a:p>
           <a:p>
             <a:r>
               <a:rPr lang="en-US" dirty="0"/>
-              <a:t>We are trying to…</a:t>
+              <a:t>Multiple agents moving to goal locations</a:t>
             </a:r>
           </a:p>
           <a:p>
             <a:r>
               <a:rPr lang="en-US" dirty="0"/>
-              <a:t>Other</a:t>
+              <a:t>Find a path to the target which is free of collisions</a:t>
             </a:r>
           </a:p>
         </p:txBody>
@@ -12036,6 +14876,83 @@
 </file>
 
 <file path=ppt/slides/slide3.xml><?xml version="1.0" encoding="utf-8"?>
+<p:sld xmlns:a="http://schemas.openxmlformats.org/drawingml/2006/main" xmlns:r="http://schemas.openxmlformats.org/officeDocument/2006/relationships" xmlns:p="http://schemas.openxmlformats.org/presentationml/2006/main">
+  <p:cSld>
+    <p:spTree>
+      <p:nvGrpSpPr>
+        <p:cNvPr id="1" name=""/>
+        <p:cNvGrpSpPr/>
+        <p:nvPr/>
+      </p:nvGrpSpPr>
+      <p:grpSpPr>
+        <a:xfrm>
+          <a:off x="0" y="0"/>
+          <a:ext cx="0" cy="0"/>
+          <a:chOff x="0" y="0"/>
+          <a:chExt cx="0" cy="0"/>
+        </a:xfrm>
+      </p:grpSpPr>
+      <p:sp>
+        <p:nvSpPr>
+          <p:cNvPr id="2" name="Title 1"/>
+          <p:cNvSpPr>
+            <a:spLocks noGrp="1"/>
+          </p:cNvSpPr>
+          <p:nvPr>
+            <p:ph type="title"/>
+          </p:nvPr>
+        </p:nvSpPr>
+        <p:spPr/>
+        <p:txBody>
+          <a:bodyPr/>
+          <a:lstStyle/>
+          <a:p>
+            <a:r>
+              <a:rPr lang="en-US" dirty="0"/>
+              <a:t>Contributions</a:t>
+            </a:r>
+          </a:p>
+        </p:txBody>
+      </p:sp>
+      <p:graphicFrame>
+        <p:nvGraphicFramePr>
+          <p:cNvPr id="4" name="Content Placeholder 3"/>
+          <p:cNvGraphicFramePr>
+            <a:graphicFrameLocks noGrp="1"/>
+          </p:cNvGraphicFramePr>
+          <p:nvPr>
+            <p:ph idx="1"/>
+            <p:extLst>
+              <p:ext uri="{D42A27DB-BD31-4B8C-83A1-F6EECF244321}">
+                <p14:modId xmlns:p14="http://schemas.microsoft.com/office/powerpoint/2010/main" val="1390645764"/>
+              </p:ext>
+            </p:extLst>
+          </p:nvPr>
+        </p:nvGraphicFramePr>
+        <p:xfrm>
+          <a:off x="819150" y="2222500"/>
+          <a:ext cx="10553700" cy="3636963"/>
+        </p:xfrm>
+        <a:graphic>
+          <a:graphicData uri="http://schemas.openxmlformats.org/drawingml/2006/diagram">
+            <dgm:relIds xmlns:dgm="http://schemas.openxmlformats.org/drawingml/2006/diagram" xmlns:r="http://schemas.openxmlformats.org/officeDocument/2006/relationships" r:dm="rId2" r:lo="rId3" r:qs="rId4" r:cs="rId5"/>
+          </a:graphicData>
+        </a:graphic>
+      </p:graphicFrame>
+    </p:spTree>
+    <p:extLst>
+      <p:ext uri="{BB962C8B-B14F-4D97-AF65-F5344CB8AC3E}">
+        <p14:creationId xmlns:p14="http://schemas.microsoft.com/office/powerpoint/2010/main" val="3292395077"/>
+      </p:ext>
+    </p:extLst>
+  </p:cSld>
+  <p:clrMapOvr>
+    <a:masterClrMapping/>
+  </p:clrMapOvr>
+</p:sld>
+</file>
+
+<file path=ppt/slides/slide4.xml><?xml version="1.0" encoding="utf-8"?>
 <p:sld xmlns:a="http://schemas.openxmlformats.org/drawingml/2006/main" xmlns:r="http://schemas.openxmlformats.org/officeDocument/2006/relationships" xmlns:p="http://schemas.openxmlformats.org/presentationml/2006/main">
   <p:cSld>
     <p:spTree>
@@ -12185,7 +15102,7 @@
 </p:sld>
 </file>
 
-<file path=ppt/slides/slide4.xml><?xml version="1.0" encoding="utf-8"?>
+<file path=ppt/slides/slide5.xml><?xml version="1.0" encoding="utf-8"?>
 <p:sld xmlns:a="http://schemas.openxmlformats.org/drawingml/2006/main" xmlns:r="http://schemas.openxmlformats.org/officeDocument/2006/relationships" xmlns:p="http://schemas.openxmlformats.org/presentationml/2006/main">
   <p:cSld>
     <p:spTree>
@@ -12262,7 +15179,7 @@
 </p:sld>
 </file>
 
-<file path=ppt/slides/slide5.xml><?xml version="1.0" encoding="utf-8"?>
+<file path=ppt/slides/slide6.xml><?xml version="1.0" encoding="utf-8"?>
 <p:sld xmlns:a="http://schemas.openxmlformats.org/drawingml/2006/main" xmlns:r="http://schemas.openxmlformats.org/officeDocument/2006/relationships" xmlns:p="http://schemas.openxmlformats.org/presentationml/2006/main">
   <p:cSld>
     <p:spTree>

</xml_diff>